<commit_message>
adding day 1 demo
</commit_message>
<xml_diff>
--- a/Week1/Week1Java.pptx
+++ b/Week1/Week1Java.pptx
@@ -7,6 +7,7 @@
   <p:sldIdLst>
     <p:sldId id="256" r:id="rId2"/>
     <p:sldId id="257" r:id="rId3"/>
+    <p:sldId id="258" r:id="rId4"/>
   </p:sldIdLst>
   <p:sldSz cx="12192000" cy="6858000"/>
   <p:notesSz cx="6858000" cy="9144000"/>
@@ -105,6 +106,11 @@
       </a:defRPr>
     </a:lvl9pPr>
   </p:defaultTextStyle>
+  <p:extLst>
+    <p:ext uri="{EFAFB233-063F-42B5-8137-9DF3F51BA10A}">
+      <p15:sldGuideLst xmlns:p15="http://schemas.microsoft.com/office/powerpoint/2012/main"/>
+    </p:ext>
+  </p:extLst>
 </p:presentation>
 </file>
 
@@ -3557,6 +3563,561 @@
 </p:sld>
 </file>
 
+<file path=ppt/slides/slide3.xml><?xml version="1.0" encoding="utf-8"?>
+<p:sld xmlns:a="http://schemas.openxmlformats.org/drawingml/2006/main" xmlns:r="http://schemas.openxmlformats.org/officeDocument/2006/relationships" xmlns:p="http://schemas.openxmlformats.org/presentationml/2006/main">
+  <p:cSld>
+    <p:spTree>
+      <p:nvGrpSpPr>
+        <p:cNvPr id="1" name=""/>
+        <p:cNvGrpSpPr/>
+        <p:nvPr/>
+      </p:nvGrpSpPr>
+      <p:grpSpPr>
+        <a:xfrm>
+          <a:off x="0" y="0"/>
+          <a:ext cx="0" cy="0"/>
+          <a:chOff x="0" y="0"/>
+          <a:chExt cx="0" cy="0"/>
+        </a:xfrm>
+      </p:grpSpPr>
+      <p:sp>
+        <p:nvSpPr>
+          <p:cNvPr id="2" name="Title 1">
+            <a:extLst>
+              <a:ext uri="{FF2B5EF4-FFF2-40B4-BE49-F238E27FC236}">
+                <a16:creationId xmlns:a16="http://schemas.microsoft.com/office/drawing/2014/main" id="{225A4D60-F7CA-42CA-B43A-A79A8E2544A5}"/>
+              </a:ext>
+            </a:extLst>
+          </p:cNvPr>
+          <p:cNvSpPr>
+            <a:spLocks noGrp="1"/>
+          </p:cNvSpPr>
+          <p:nvPr>
+            <p:ph type="title"/>
+          </p:nvPr>
+        </p:nvSpPr>
+        <p:spPr/>
+        <p:txBody>
+          <a:bodyPr/>
+          <a:lstStyle/>
+          <a:p>
+            <a:r>
+              <a:rPr lang="en-US" dirty="0"/>
+              <a:t>Full Stack Application </a:t>
+            </a:r>
+            <a:r>
+              <a:rPr lang="en-US" dirty="0">
+                <a:sym typeface="Wingdings" panose="05000000000000000000" pitchFamily="2" charset="2"/>
+              </a:rPr>
+              <a:t> this is the goal?</a:t>
+            </a:r>
+            <a:endParaRPr lang="en-US" dirty="0"/>
+          </a:p>
+        </p:txBody>
+      </p:sp>
+      <p:sp>
+        <p:nvSpPr>
+          <p:cNvPr id="4" name="Oval 3">
+            <a:extLst>
+              <a:ext uri="{FF2B5EF4-FFF2-40B4-BE49-F238E27FC236}">
+                <a16:creationId xmlns:a16="http://schemas.microsoft.com/office/drawing/2014/main" id="{04FE0520-06AA-44CA-BEEE-E8EE2E3777E3}"/>
+              </a:ext>
+            </a:extLst>
+          </p:cNvPr>
+          <p:cNvSpPr/>
+          <p:nvPr/>
+        </p:nvSpPr>
+        <p:spPr>
+          <a:xfrm>
+            <a:off x="3409026" y="2032986"/>
+            <a:ext cx="2254928" cy="1713390"/>
+          </a:xfrm>
+          <a:prstGeom prst="ellipse">
+            <a:avLst/>
+          </a:prstGeom>
+        </p:spPr>
+        <p:style>
+          <a:lnRef idx="2">
+            <a:schemeClr val="accent1">
+              <a:shade val="50000"/>
+            </a:schemeClr>
+          </a:lnRef>
+          <a:fillRef idx="1">
+            <a:schemeClr val="accent1"/>
+          </a:fillRef>
+          <a:effectRef idx="0">
+            <a:schemeClr val="accent1"/>
+          </a:effectRef>
+          <a:fontRef idx="minor">
+            <a:schemeClr val="lt1"/>
+          </a:fontRef>
+        </p:style>
+        <p:txBody>
+          <a:bodyPr rtlCol="0" anchor="ctr"/>
+          <a:lstStyle/>
+          <a:p>
+            <a:pPr algn="ctr"/>
+            <a:r>
+              <a:rPr lang="en-US" dirty="0"/>
+              <a:t>Client</a:t>
+            </a:r>
+          </a:p>
+        </p:txBody>
+      </p:sp>
+      <p:sp>
+        <p:nvSpPr>
+          <p:cNvPr id="6" name="Oval 5">
+            <a:extLst>
+              <a:ext uri="{FF2B5EF4-FFF2-40B4-BE49-F238E27FC236}">
+                <a16:creationId xmlns:a16="http://schemas.microsoft.com/office/drawing/2014/main" id="{84ED5525-9845-4094-9CEB-DD6B0E48E9EE}"/>
+              </a:ext>
+            </a:extLst>
+          </p:cNvPr>
+          <p:cNvSpPr/>
+          <p:nvPr/>
+        </p:nvSpPr>
+        <p:spPr>
+          <a:xfrm>
+            <a:off x="7050352" y="1626210"/>
+            <a:ext cx="2254928" cy="1713390"/>
+          </a:xfrm>
+          <a:prstGeom prst="ellipse">
+            <a:avLst/>
+          </a:prstGeom>
+        </p:spPr>
+        <p:style>
+          <a:lnRef idx="2">
+            <a:schemeClr val="accent4">
+              <a:shade val="50000"/>
+            </a:schemeClr>
+          </a:lnRef>
+          <a:fillRef idx="1">
+            <a:schemeClr val="accent4"/>
+          </a:fillRef>
+          <a:effectRef idx="0">
+            <a:schemeClr val="accent4"/>
+          </a:effectRef>
+          <a:fontRef idx="minor">
+            <a:schemeClr val="lt1"/>
+          </a:fontRef>
+        </p:style>
+        <p:txBody>
+          <a:bodyPr rtlCol="0" anchor="ctr"/>
+          <a:lstStyle/>
+          <a:p>
+            <a:pPr algn="ctr"/>
+            <a:r>
+              <a:rPr lang="en-US" dirty="0"/>
+              <a:t>Server</a:t>
+            </a:r>
+          </a:p>
+        </p:txBody>
+      </p:sp>
+      <p:pic>
+        <p:nvPicPr>
+          <p:cNvPr id="8" name="Graphic 7" descr="Computer">
+            <a:extLst>
+              <a:ext uri="{FF2B5EF4-FFF2-40B4-BE49-F238E27FC236}">
+                <a16:creationId xmlns:a16="http://schemas.microsoft.com/office/drawing/2014/main" id="{67E4AFE4-CB8F-43A2-A79D-7F05666639AD}"/>
+              </a:ext>
+            </a:extLst>
+          </p:cNvPr>
+          <p:cNvPicPr>
+            <a:picLocks noChangeAspect="1"/>
+          </p:cNvPicPr>
+          <p:nvPr/>
+        </p:nvPicPr>
+        <p:blipFill>
+          <a:blip r:embed="rId2">
+            <a:extLst>
+              <a:ext uri="{28A0092B-C50C-407E-A947-70E740481C1C}">
+                <a14:useLocalDpi xmlns:a14="http://schemas.microsoft.com/office/drawing/2010/main" val="0"/>
+              </a:ext>
+              <a:ext uri="{96DAC541-7B7A-43D3-8B79-37D633B846F1}">
+                <asvg:svgBlip xmlns:asvg="http://schemas.microsoft.com/office/drawing/2016/SVG/main" r:embed="rId3"/>
+              </a:ext>
+            </a:extLst>
+          </a:blip>
+          <a:stretch>
+            <a:fillRect/>
+          </a:stretch>
+        </p:blipFill>
+        <p:spPr>
+          <a:xfrm>
+            <a:off x="187911" y="4988512"/>
+            <a:ext cx="1649766" cy="1649766"/>
+          </a:xfrm>
+          <a:prstGeom prst="rect">
+            <a:avLst/>
+          </a:prstGeom>
+        </p:spPr>
+      </p:pic>
+      <p:cxnSp>
+        <p:nvCxnSpPr>
+          <p:cNvPr id="10" name="Straight Arrow Connector 9">
+            <a:extLst>
+              <a:ext uri="{FF2B5EF4-FFF2-40B4-BE49-F238E27FC236}">
+                <a16:creationId xmlns:a16="http://schemas.microsoft.com/office/drawing/2014/main" id="{9F840A50-1B9A-48DF-883A-31EB5C850D4C}"/>
+              </a:ext>
+            </a:extLst>
+          </p:cNvPr>
+          <p:cNvCxnSpPr>
+            <a:endCxn id="4" idx="2"/>
+          </p:cNvCxnSpPr>
+          <p:nvPr/>
+        </p:nvCxnSpPr>
+        <p:spPr>
+          <a:xfrm flipV="1">
+            <a:off x="1846555" y="2889681"/>
+            <a:ext cx="1562471" cy="2090692"/>
+          </a:xfrm>
+          <a:prstGeom prst="straightConnector1">
+            <a:avLst/>
+          </a:prstGeom>
+          <a:ln>
+            <a:tailEnd type="triangle"/>
+          </a:ln>
+        </p:spPr>
+        <p:style>
+          <a:lnRef idx="1">
+            <a:schemeClr val="accent1"/>
+          </a:lnRef>
+          <a:fillRef idx="0">
+            <a:schemeClr val="accent1"/>
+          </a:fillRef>
+          <a:effectRef idx="0">
+            <a:schemeClr val="accent1"/>
+          </a:effectRef>
+          <a:fontRef idx="minor">
+            <a:schemeClr val="tx1"/>
+          </a:fontRef>
+        </p:style>
+      </p:cxnSp>
+      <p:cxnSp>
+        <p:nvCxnSpPr>
+          <p:cNvPr id="11" name="Straight Arrow Connector 10">
+            <a:extLst>
+              <a:ext uri="{FF2B5EF4-FFF2-40B4-BE49-F238E27FC236}">
+                <a16:creationId xmlns:a16="http://schemas.microsoft.com/office/drawing/2014/main" id="{E60811D2-84C2-403A-9E70-BFC0FDF9DA6A}"/>
+              </a:ext>
+            </a:extLst>
+          </p:cNvPr>
+          <p:cNvCxnSpPr>
+            <a:cxnSpLocks/>
+            <a:stCxn id="4" idx="6"/>
+            <a:endCxn id="6" idx="2"/>
+          </p:cNvCxnSpPr>
+          <p:nvPr/>
+        </p:nvCxnSpPr>
+        <p:spPr>
+          <a:xfrm flipV="1">
+            <a:off x="5663954" y="2482905"/>
+            <a:ext cx="1386398" cy="406776"/>
+          </a:xfrm>
+          <a:prstGeom prst="straightConnector1">
+            <a:avLst/>
+          </a:prstGeom>
+          <a:ln>
+            <a:tailEnd type="triangle"/>
+          </a:ln>
+        </p:spPr>
+        <p:style>
+          <a:lnRef idx="1">
+            <a:schemeClr val="accent1"/>
+          </a:lnRef>
+          <a:fillRef idx="0">
+            <a:schemeClr val="accent1"/>
+          </a:fillRef>
+          <a:effectRef idx="0">
+            <a:schemeClr val="accent1"/>
+          </a:effectRef>
+          <a:fontRef idx="minor">
+            <a:schemeClr val="tx1"/>
+          </a:fontRef>
+        </p:style>
+      </p:cxnSp>
+      <p:pic>
+        <p:nvPicPr>
+          <p:cNvPr id="15" name="Graphic 14" descr="Database">
+            <a:extLst>
+              <a:ext uri="{FF2B5EF4-FFF2-40B4-BE49-F238E27FC236}">
+                <a16:creationId xmlns:a16="http://schemas.microsoft.com/office/drawing/2014/main" id="{34DB48BB-AA35-4091-BC72-CF7516907B52}"/>
+              </a:ext>
+            </a:extLst>
+          </p:cNvPr>
+          <p:cNvPicPr>
+            <a:picLocks noChangeAspect="1"/>
+          </p:cNvPicPr>
+          <p:nvPr/>
+        </p:nvPicPr>
+        <p:blipFill>
+          <a:blip r:embed="rId4">
+            <a:extLst>
+              <a:ext uri="{28A0092B-C50C-407E-A947-70E740481C1C}">
+                <a14:useLocalDpi xmlns:a14="http://schemas.microsoft.com/office/drawing/2010/main" val="0"/>
+              </a:ext>
+              <a:ext uri="{96DAC541-7B7A-43D3-8B79-37D633B846F1}">
+                <asvg:svgBlip xmlns:asvg="http://schemas.microsoft.com/office/drawing/2016/SVG/main" r:embed="rId5"/>
+              </a:ext>
+            </a:extLst>
+          </a:blip>
+          <a:stretch>
+            <a:fillRect/>
+          </a:stretch>
+        </p:blipFill>
+        <p:spPr>
+          <a:xfrm>
+            <a:off x="10093911" y="3539845"/>
+            <a:ext cx="1649766" cy="1649766"/>
+          </a:xfrm>
+          <a:prstGeom prst="rect">
+            <a:avLst/>
+          </a:prstGeom>
+        </p:spPr>
+      </p:pic>
+      <p:cxnSp>
+        <p:nvCxnSpPr>
+          <p:cNvPr id="16" name="Straight Arrow Connector 15">
+            <a:extLst>
+              <a:ext uri="{FF2B5EF4-FFF2-40B4-BE49-F238E27FC236}">
+                <a16:creationId xmlns:a16="http://schemas.microsoft.com/office/drawing/2014/main" id="{3A3BF8BD-B109-46B5-9905-B82970D4023C}"/>
+              </a:ext>
+            </a:extLst>
+          </p:cNvPr>
+          <p:cNvCxnSpPr>
+            <a:cxnSpLocks/>
+            <a:stCxn id="6" idx="6"/>
+            <a:endCxn id="15" idx="0"/>
+          </p:cNvCxnSpPr>
+          <p:nvPr/>
+        </p:nvCxnSpPr>
+        <p:spPr>
+          <a:xfrm>
+            <a:off x="9305280" y="2482905"/>
+            <a:ext cx="1613514" cy="1056940"/>
+          </a:xfrm>
+          <a:prstGeom prst="straightConnector1">
+            <a:avLst/>
+          </a:prstGeom>
+          <a:ln>
+            <a:tailEnd type="triangle"/>
+          </a:ln>
+        </p:spPr>
+        <p:style>
+          <a:lnRef idx="1">
+            <a:schemeClr val="accent1"/>
+          </a:lnRef>
+          <a:fillRef idx="0">
+            <a:schemeClr val="accent1"/>
+          </a:fillRef>
+          <a:effectRef idx="0">
+            <a:schemeClr val="accent1"/>
+          </a:effectRef>
+          <a:fontRef idx="minor">
+            <a:schemeClr val="tx1"/>
+          </a:fontRef>
+        </p:style>
+      </p:cxnSp>
+      <p:sp>
+        <p:nvSpPr>
+          <p:cNvPr id="21" name="TextBox 20">
+            <a:extLst>
+              <a:ext uri="{FF2B5EF4-FFF2-40B4-BE49-F238E27FC236}">
+                <a16:creationId xmlns:a16="http://schemas.microsoft.com/office/drawing/2014/main" id="{48586AE4-432E-4A1A-965C-B3A73D8E15EA}"/>
+              </a:ext>
+            </a:extLst>
+          </p:cNvPr>
+          <p:cNvSpPr txBox="1"/>
+          <p:nvPr/>
+        </p:nvSpPr>
+        <p:spPr>
+          <a:xfrm>
+            <a:off x="7537143" y="3977196"/>
+            <a:ext cx="1980732" cy="1754326"/>
+          </a:xfrm>
+          <a:prstGeom prst="rect">
+            <a:avLst/>
+          </a:prstGeom>
+          <a:noFill/>
+        </p:spPr>
+        <p:txBody>
+          <a:bodyPr wrap="square" rtlCol="0">
+            <a:spAutoFit/>
+          </a:bodyPr>
+          <a:lstStyle/>
+          <a:p>
+            <a:pPr marL="285750" indent="-285750">
+              <a:buFont typeface="Arial" panose="020B0604020202020204" pitchFamily="34" charset="0"/>
+              <a:buChar char="•"/>
+            </a:pPr>
+            <a:r>
+              <a:rPr lang="en-US" dirty="0"/>
+              <a:t>Java</a:t>
+            </a:r>
+          </a:p>
+          <a:p>
+            <a:pPr marL="285750" indent="-285750">
+              <a:buFont typeface="Arial" panose="020B0604020202020204" pitchFamily="34" charset="0"/>
+              <a:buChar char="•"/>
+            </a:pPr>
+            <a:r>
+              <a:rPr lang="en-US" dirty="0"/>
+              <a:t>Servlets</a:t>
+            </a:r>
+          </a:p>
+          <a:p>
+            <a:pPr marL="285750" indent="-285750">
+              <a:buFont typeface="Arial" panose="020B0604020202020204" pitchFamily="34" charset="0"/>
+              <a:buChar char="•"/>
+            </a:pPr>
+            <a:r>
+              <a:rPr lang="en-US" dirty="0"/>
+              <a:t>Hibernate</a:t>
+            </a:r>
+          </a:p>
+          <a:p>
+            <a:pPr marL="285750" indent="-285750">
+              <a:buFont typeface="Arial" panose="020B0604020202020204" pitchFamily="34" charset="0"/>
+              <a:buChar char="•"/>
+            </a:pPr>
+            <a:r>
+              <a:rPr lang="en-US" dirty="0"/>
+              <a:t>Spring</a:t>
+            </a:r>
+          </a:p>
+          <a:p>
+            <a:pPr marL="285750" indent="-285750">
+              <a:buFont typeface="Arial" panose="020B0604020202020204" pitchFamily="34" charset="0"/>
+              <a:buChar char="•"/>
+            </a:pPr>
+            <a:r>
+              <a:rPr lang="en-US" dirty="0"/>
+              <a:t>Spring Boot</a:t>
+            </a:r>
+          </a:p>
+          <a:p>
+            <a:pPr marL="285750" indent="-285750">
+              <a:buFont typeface="Arial" panose="020B0604020202020204" pitchFamily="34" charset="0"/>
+              <a:buChar char="•"/>
+            </a:pPr>
+            <a:r>
+              <a:rPr lang="en-US" dirty="0"/>
+              <a:t>Microservices</a:t>
+            </a:r>
+          </a:p>
+        </p:txBody>
+      </p:sp>
+      <p:sp>
+        <p:nvSpPr>
+          <p:cNvPr id="24" name="TextBox 23">
+            <a:extLst>
+              <a:ext uri="{FF2B5EF4-FFF2-40B4-BE49-F238E27FC236}">
+                <a16:creationId xmlns:a16="http://schemas.microsoft.com/office/drawing/2014/main" id="{77ED267B-F1EF-4E64-904F-D1817F808F2A}"/>
+              </a:ext>
+            </a:extLst>
+          </p:cNvPr>
+          <p:cNvSpPr txBox="1"/>
+          <p:nvPr/>
+        </p:nvSpPr>
+        <p:spPr>
+          <a:xfrm>
+            <a:off x="10356505" y="5115559"/>
+            <a:ext cx="1678891" cy="369332"/>
+          </a:xfrm>
+          <a:prstGeom prst="rect">
+            <a:avLst/>
+          </a:prstGeom>
+          <a:noFill/>
+        </p:spPr>
+        <p:txBody>
+          <a:bodyPr wrap="square" rtlCol="0">
+            <a:spAutoFit/>
+          </a:bodyPr>
+          <a:lstStyle/>
+          <a:p>
+            <a:pPr marL="285750" indent="-285750">
+              <a:buFont typeface="Arial" panose="020B0604020202020204" pitchFamily="34" charset="0"/>
+              <a:buChar char="•"/>
+            </a:pPr>
+            <a:r>
+              <a:rPr lang="en-US" dirty="0"/>
+              <a:t>SQL</a:t>
+            </a:r>
+          </a:p>
+        </p:txBody>
+      </p:sp>
+      <p:sp>
+        <p:nvSpPr>
+          <p:cNvPr id="31" name="TextBox 30">
+            <a:extLst>
+              <a:ext uri="{FF2B5EF4-FFF2-40B4-BE49-F238E27FC236}">
+                <a16:creationId xmlns:a16="http://schemas.microsoft.com/office/drawing/2014/main" id="{8198A28F-5194-4543-BEE7-B251ACB26925}"/>
+              </a:ext>
+            </a:extLst>
+          </p:cNvPr>
+          <p:cNvSpPr txBox="1"/>
+          <p:nvPr/>
+        </p:nvSpPr>
+        <p:spPr>
+          <a:xfrm>
+            <a:off x="3827755" y="3977196"/>
+            <a:ext cx="1678891" cy="923330"/>
+          </a:xfrm>
+          <a:prstGeom prst="rect">
+            <a:avLst/>
+          </a:prstGeom>
+          <a:noFill/>
+        </p:spPr>
+        <p:txBody>
+          <a:bodyPr wrap="square" rtlCol="0">
+            <a:spAutoFit/>
+          </a:bodyPr>
+          <a:lstStyle/>
+          <a:p>
+            <a:pPr marL="285750" indent="-285750">
+              <a:buFont typeface="Arial" panose="020B0604020202020204" pitchFamily="34" charset="0"/>
+              <a:buChar char="•"/>
+            </a:pPr>
+            <a:r>
+              <a:rPr lang="en-US" dirty="0"/>
+              <a:t>HTML/CSS</a:t>
+            </a:r>
+          </a:p>
+          <a:p>
+            <a:pPr marL="285750" indent="-285750">
+              <a:buFont typeface="Arial" panose="020B0604020202020204" pitchFamily="34" charset="0"/>
+              <a:buChar char="•"/>
+            </a:pPr>
+            <a:r>
+              <a:rPr lang="en-US" dirty="0"/>
+              <a:t>JS</a:t>
+            </a:r>
+          </a:p>
+          <a:p>
+            <a:pPr marL="285750" indent="-285750">
+              <a:buFont typeface="Arial" panose="020B0604020202020204" pitchFamily="34" charset="0"/>
+              <a:buChar char="•"/>
+            </a:pPr>
+            <a:r>
+              <a:rPr lang="en-US" dirty="0"/>
+              <a:t>React/Redux</a:t>
+            </a:r>
+          </a:p>
+        </p:txBody>
+      </p:sp>
+    </p:spTree>
+    <p:extLst>
+      <p:ext uri="{BB962C8B-B14F-4D97-AF65-F5344CB8AC3E}">
+        <p14:creationId xmlns:p14="http://schemas.microsoft.com/office/powerpoint/2010/main" val="1593984783"/>
+      </p:ext>
+    </p:extLst>
+  </p:cSld>
+  <p:clrMapOvr>
+    <a:masterClrMapping/>
+  </p:clrMapOvr>
+</p:sld>
+</file>
+
 <file path=ppt/theme/theme1.xml><?xml version="1.0" encoding="utf-8"?>
 <a:theme xmlns:a="http://schemas.openxmlformats.org/drawingml/2006/main" name="Office Theme">
   <a:themeElements>

</xml_diff>

<commit_message>
added info about serts
</commit_message>
<xml_diff>
--- a/Week1/Week1Java.pptx
+++ b/Week1/Week1Java.pptx
@@ -8,6 +8,7 @@
     <p:sldId id="256" r:id="rId2"/>
     <p:sldId id="257" r:id="rId3"/>
     <p:sldId id="258" r:id="rId4"/>
+    <p:sldId id="259" r:id="rId5"/>
   </p:sldIdLst>
   <p:sldSz cx="12192000" cy="6858000"/>
   <p:notesSz cx="6858000" cy="9144000"/>
@@ -261,7 +262,7 @@
           <a:p>
             <a:fld id="{86108D1E-0F48-4D71-8A61-3A4FB1009D51}" type="datetimeFigureOut">
               <a:rPr lang="en-US" smtClean="0"/>
-              <a:t>11/9/2020</a:t>
+              <a:t>11/10/2020</a:t>
             </a:fld>
             <a:endParaRPr lang="en-US"/>
           </a:p>
@@ -459,7 +460,7 @@
           <a:p>
             <a:fld id="{86108D1E-0F48-4D71-8A61-3A4FB1009D51}" type="datetimeFigureOut">
               <a:rPr lang="en-US" smtClean="0"/>
-              <a:t>11/9/2020</a:t>
+              <a:t>11/10/2020</a:t>
             </a:fld>
             <a:endParaRPr lang="en-US"/>
           </a:p>
@@ -667,7 +668,7 @@
           <a:p>
             <a:fld id="{86108D1E-0F48-4D71-8A61-3A4FB1009D51}" type="datetimeFigureOut">
               <a:rPr lang="en-US" smtClean="0"/>
-              <a:t>11/9/2020</a:t>
+              <a:t>11/10/2020</a:t>
             </a:fld>
             <a:endParaRPr lang="en-US"/>
           </a:p>
@@ -865,7 +866,7 @@
           <a:p>
             <a:fld id="{86108D1E-0F48-4D71-8A61-3A4FB1009D51}" type="datetimeFigureOut">
               <a:rPr lang="en-US" smtClean="0"/>
-              <a:t>11/9/2020</a:t>
+              <a:t>11/10/2020</a:t>
             </a:fld>
             <a:endParaRPr lang="en-US"/>
           </a:p>
@@ -1140,7 +1141,7 @@
           <a:p>
             <a:fld id="{86108D1E-0F48-4D71-8A61-3A4FB1009D51}" type="datetimeFigureOut">
               <a:rPr lang="en-US" smtClean="0"/>
-              <a:t>11/9/2020</a:t>
+              <a:t>11/10/2020</a:t>
             </a:fld>
             <a:endParaRPr lang="en-US"/>
           </a:p>
@@ -1405,7 +1406,7 @@
           <a:p>
             <a:fld id="{86108D1E-0F48-4D71-8A61-3A4FB1009D51}" type="datetimeFigureOut">
               <a:rPr lang="en-US" smtClean="0"/>
-              <a:t>11/9/2020</a:t>
+              <a:t>11/10/2020</a:t>
             </a:fld>
             <a:endParaRPr lang="en-US"/>
           </a:p>
@@ -1817,7 +1818,7 @@
           <a:p>
             <a:fld id="{86108D1E-0F48-4D71-8A61-3A4FB1009D51}" type="datetimeFigureOut">
               <a:rPr lang="en-US" smtClean="0"/>
-              <a:t>11/9/2020</a:t>
+              <a:t>11/10/2020</a:t>
             </a:fld>
             <a:endParaRPr lang="en-US"/>
           </a:p>
@@ -1958,7 +1959,7 @@
           <a:p>
             <a:fld id="{86108D1E-0F48-4D71-8A61-3A4FB1009D51}" type="datetimeFigureOut">
               <a:rPr lang="en-US" smtClean="0"/>
-              <a:t>11/9/2020</a:t>
+              <a:t>11/10/2020</a:t>
             </a:fld>
             <a:endParaRPr lang="en-US"/>
           </a:p>
@@ -2071,7 +2072,7 @@
           <a:p>
             <a:fld id="{86108D1E-0F48-4D71-8A61-3A4FB1009D51}" type="datetimeFigureOut">
               <a:rPr lang="en-US" smtClean="0"/>
-              <a:t>11/9/2020</a:t>
+              <a:t>11/10/2020</a:t>
             </a:fld>
             <a:endParaRPr lang="en-US"/>
           </a:p>
@@ -2382,7 +2383,7 @@
           <a:p>
             <a:fld id="{86108D1E-0F48-4D71-8A61-3A4FB1009D51}" type="datetimeFigureOut">
               <a:rPr lang="en-US" smtClean="0"/>
-              <a:t>11/9/2020</a:t>
+              <a:t>11/10/2020</a:t>
             </a:fld>
             <a:endParaRPr lang="en-US"/>
           </a:p>
@@ -2670,7 +2671,7 @@
           <a:p>
             <a:fld id="{86108D1E-0F48-4D71-8A61-3A4FB1009D51}" type="datetimeFigureOut">
               <a:rPr lang="en-US" smtClean="0"/>
-              <a:t>11/9/2020</a:t>
+              <a:t>11/10/2020</a:t>
             </a:fld>
             <a:endParaRPr lang="en-US"/>
           </a:p>
@@ -2911,7 +2912,7 @@
           <a:p>
             <a:fld id="{86108D1E-0F48-4D71-8A61-3A4FB1009D51}" type="datetimeFigureOut">
               <a:rPr lang="en-US" smtClean="0"/>
-              <a:t>11/9/2020</a:t>
+              <a:t>11/10/2020</a:t>
             </a:fld>
             <a:endParaRPr lang="en-US"/>
           </a:p>
@@ -4118,6 +4119,119 @@
 </p:sld>
 </file>
 
+<file path=ppt/slides/slide4.xml><?xml version="1.0" encoding="utf-8"?>
+<p:sld xmlns:a="http://schemas.openxmlformats.org/drawingml/2006/main" xmlns:r="http://schemas.openxmlformats.org/officeDocument/2006/relationships" xmlns:p="http://schemas.openxmlformats.org/presentationml/2006/main">
+  <p:cSld>
+    <p:spTree>
+      <p:nvGrpSpPr>
+        <p:cNvPr id="1" name=""/>
+        <p:cNvGrpSpPr/>
+        <p:nvPr/>
+      </p:nvGrpSpPr>
+      <p:grpSpPr>
+        <a:xfrm>
+          <a:off x="0" y="0"/>
+          <a:ext cx="0" cy="0"/>
+          <a:chOff x="0" y="0"/>
+          <a:chExt cx="0" cy="0"/>
+        </a:xfrm>
+      </p:grpSpPr>
+      <p:sp>
+        <p:nvSpPr>
+          <p:cNvPr id="2" name="Title 1">
+            <a:extLst>
+              <a:ext uri="{FF2B5EF4-FFF2-40B4-BE49-F238E27FC236}">
+                <a16:creationId xmlns:a16="http://schemas.microsoft.com/office/drawing/2014/main" id="{66DF7FFD-2090-4299-A25A-F796B3774FC8}"/>
+              </a:ext>
+            </a:extLst>
+          </p:cNvPr>
+          <p:cNvSpPr>
+            <a:spLocks noGrp="1"/>
+          </p:cNvSpPr>
+          <p:nvPr>
+            <p:ph type="title"/>
+          </p:nvPr>
+        </p:nvSpPr>
+        <p:spPr/>
+        <p:txBody>
+          <a:bodyPr/>
+          <a:lstStyle/>
+          <a:p>
+            <a:r>
+              <a:rPr lang="en-US" dirty="0"/>
+              <a:t>What are we building? </a:t>
+            </a:r>
+          </a:p>
+        </p:txBody>
+      </p:sp>
+      <p:sp>
+        <p:nvSpPr>
+          <p:cNvPr id="3" name="Content Placeholder 2">
+            <a:extLst>
+              <a:ext uri="{FF2B5EF4-FFF2-40B4-BE49-F238E27FC236}">
+                <a16:creationId xmlns:a16="http://schemas.microsoft.com/office/drawing/2014/main" id="{7D1CB373-9FD3-4AED-8DE9-9539B1A42549}"/>
+              </a:ext>
+            </a:extLst>
+          </p:cNvPr>
+          <p:cNvSpPr>
+            <a:spLocks noGrp="1"/>
+          </p:cNvSpPr>
+          <p:nvPr>
+            <p:ph idx="1"/>
+          </p:nvPr>
+        </p:nvSpPr>
+        <p:spPr/>
+        <p:txBody>
+          <a:bodyPr/>
+          <a:lstStyle/>
+          <a:p>
+            <a:r>
+              <a:rPr lang="en-US" dirty="0"/>
+              <a:t>Pirates!</a:t>
+            </a:r>
+          </a:p>
+          <a:p>
+            <a:pPr lvl="1"/>
+            <a:r>
+              <a:rPr lang="en-US" dirty="0"/>
+              <a:t>Ships</a:t>
+            </a:r>
+          </a:p>
+          <a:p>
+            <a:pPr lvl="1"/>
+            <a:r>
+              <a:rPr lang="en-US" dirty="0"/>
+              <a:t>Role</a:t>
+            </a:r>
+          </a:p>
+          <a:p>
+            <a:pPr lvl="1"/>
+            <a:r>
+              <a:rPr lang="en-US" dirty="0"/>
+              <a:t>Treasure</a:t>
+            </a:r>
+          </a:p>
+          <a:p>
+            <a:endParaRPr lang="en-US" dirty="0"/>
+          </a:p>
+          <a:p>
+            <a:endParaRPr lang="en-US" dirty="0"/>
+          </a:p>
+        </p:txBody>
+      </p:sp>
+    </p:spTree>
+    <p:extLst>
+      <p:ext uri="{BB962C8B-B14F-4D97-AF65-F5344CB8AC3E}">
+        <p14:creationId xmlns:p14="http://schemas.microsoft.com/office/powerpoint/2010/main" val="4212173047"/>
+      </p:ext>
+    </p:extLst>
+  </p:cSld>
+  <p:clrMapOvr>
+    <a:masterClrMapping/>
+  </p:clrMapOvr>
+</p:sld>
+</file>
+
 <file path=ppt/theme/theme1.xml><?xml version="1.0" encoding="utf-8"?>
 <a:theme xmlns:a="http://schemas.openxmlformats.org/drawingml/2006/main" name="Office Theme">
   <a:themeElements>

</xml_diff>

<commit_message>
added extra java examples
</commit_message>
<xml_diff>
--- a/Week1/Week1Java.pptx
+++ b/Week1/Week1Java.pptx
@@ -8,7 +8,10 @@
     <p:sldId id="256" r:id="rId2"/>
     <p:sldId id="257" r:id="rId3"/>
     <p:sldId id="258" r:id="rId4"/>
-    <p:sldId id="259" r:id="rId5"/>
+    <p:sldId id="261" r:id="rId5"/>
+    <p:sldId id="262" r:id="rId6"/>
+    <p:sldId id="259" r:id="rId7"/>
+    <p:sldId id="260" r:id="rId8"/>
   </p:sldIdLst>
   <p:sldSz cx="12192000" cy="6858000"/>
   <p:notesSz cx="6858000" cy="9144000"/>
@@ -262,7 +265,7 @@
           <a:p>
             <a:fld id="{86108D1E-0F48-4D71-8A61-3A4FB1009D51}" type="datetimeFigureOut">
               <a:rPr lang="en-US" smtClean="0"/>
-              <a:t>11/10/2020</a:t>
+              <a:t>11/11/2020</a:t>
             </a:fld>
             <a:endParaRPr lang="en-US"/>
           </a:p>
@@ -460,7 +463,7 @@
           <a:p>
             <a:fld id="{86108D1E-0F48-4D71-8A61-3A4FB1009D51}" type="datetimeFigureOut">
               <a:rPr lang="en-US" smtClean="0"/>
-              <a:t>11/10/2020</a:t>
+              <a:t>11/11/2020</a:t>
             </a:fld>
             <a:endParaRPr lang="en-US"/>
           </a:p>
@@ -668,7 +671,7 @@
           <a:p>
             <a:fld id="{86108D1E-0F48-4D71-8A61-3A4FB1009D51}" type="datetimeFigureOut">
               <a:rPr lang="en-US" smtClean="0"/>
-              <a:t>11/10/2020</a:t>
+              <a:t>11/11/2020</a:t>
             </a:fld>
             <a:endParaRPr lang="en-US"/>
           </a:p>
@@ -866,7 +869,7 @@
           <a:p>
             <a:fld id="{86108D1E-0F48-4D71-8A61-3A4FB1009D51}" type="datetimeFigureOut">
               <a:rPr lang="en-US" smtClean="0"/>
-              <a:t>11/10/2020</a:t>
+              <a:t>11/11/2020</a:t>
             </a:fld>
             <a:endParaRPr lang="en-US"/>
           </a:p>
@@ -1141,7 +1144,7 @@
           <a:p>
             <a:fld id="{86108D1E-0F48-4D71-8A61-3A4FB1009D51}" type="datetimeFigureOut">
               <a:rPr lang="en-US" smtClean="0"/>
-              <a:t>11/10/2020</a:t>
+              <a:t>11/11/2020</a:t>
             </a:fld>
             <a:endParaRPr lang="en-US"/>
           </a:p>
@@ -1406,7 +1409,7 @@
           <a:p>
             <a:fld id="{86108D1E-0F48-4D71-8A61-3A4FB1009D51}" type="datetimeFigureOut">
               <a:rPr lang="en-US" smtClean="0"/>
-              <a:t>11/10/2020</a:t>
+              <a:t>11/11/2020</a:t>
             </a:fld>
             <a:endParaRPr lang="en-US"/>
           </a:p>
@@ -1818,7 +1821,7 @@
           <a:p>
             <a:fld id="{86108D1E-0F48-4D71-8A61-3A4FB1009D51}" type="datetimeFigureOut">
               <a:rPr lang="en-US" smtClean="0"/>
-              <a:t>11/10/2020</a:t>
+              <a:t>11/11/2020</a:t>
             </a:fld>
             <a:endParaRPr lang="en-US"/>
           </a:p>
@@ -1959,7 +1962,7 @@
           <a:p>
             <a:fld id="{86108D1E-0F48-4D71-8A61-3A4FB1009D51}" type="datetimeFigureOut">
               <a:rPr lang="en-US" smtClean="0"/>
-              <a:t>11/10/2020</a:t>
+              <a:t>11/11/2020</a:t>
             </a:fld>
             <a:endParaRPr lang="en-US"/>
           </a:p>
@@ -2072,7 +2075,7 @@
           <a:p>
             <a:fld id="{86108D1E-0F48-4D71-8A61-3A4FB1009D51}" type="datetimeFigureOut">
               <a:rPr lang="en-US" smtClean="0"/>
-              <a:t>11/10/2020</a:t>
+              <a:t>11/11/2020</a:t>
             </a:fld>
             <a:endParaRPr lang="en-US"/>
           </a:p>
@@ -2383,7 +2386,7 @@
           <a:p>
             <a:fld id="{86108D1E-0F48-4D71-8A61-3A4FB1009D51}" type="datetimeFigureOut">
               <a:rPr lang="en-US" smtClean="0"/>
-              <a:t>11/10/2020</a:t>
+              <a:t>11/11/2020</a:t>
             </a:fld>
             <a:endParaRPr lang="en-US"/>
           </a:p>
@@ -2671,7 +2674,7 @@
           <a:p>
             <a:fld id="{86108D1E-0F48-4D71-8A61-3A4FB1009D51}" type="datetimeFigureOut">
               <a:rPr lang="en-US" smtClean="0"/>
-              <a:t>11/10/2020</a:t>
+              <a:t>11/11/2020</a:t>
             </a:fld>
             <a:endParaRPr lang="en-US"/>
           </a:p>
@@ -2912,7 +2915,7 @@
           <a:p>
             <a:fld id="{86108D1E-0F48-4D71-8A61-3A4FB1009D51}" type="datetimeFigureOut">
               <a:rPr lang="en-US" smtClean="0"/>
-              <a:t>11/10/2020</a:t>
+              <a:t>11/11/2020</a:t>
             </a:fld>
             <a:endParaRPr lang="en-US"/>
           </a:p>
@@ -4141,6 +4144,1526 @@
           <p:cNvPr id="2" name="Title 1">
             <a:extLst>
               <a:ext uri="{FF2B5EF4-FFF2-40B4-BE49-F238E27FC236}">
+                <a16:creationId xmlns:a16="http://schemas.microsoft.com/office/drawing/2014/main" id="{31A954B4-1309-4236-846F-E41FA8E87326}"/>
+              </a:ext>
+            </a:extLst>
+          </p:cNvPr>
+          <p:cNvSpPr>
+            <a:spLocks noGrp="1"/>
+          </p:cNvSpPr>
+          <p:nvPr>
+            <p:ph type="title"/>
+          </p:nvPr>
+        </p:nvSpPr>
+        <p:spPr/>
+        <p:txBody>
+          <a:bodyPr/>
+          <a:lstStyle/>
+          <a:p>
+            <a:r>
+              <a:rPr lang="en-US" dirty="0"/>
+              <a:t>Stack vs Heap</a:t>
+            </a:r>
+          </a:p>
+        </p:txBody>
+      </p:sp>
+      <p:sp>
+        <p:nvSpPr>
+          <p:cNvPr id="4" name="Cloud 3">
+            <a:extLst>
+              <a:ext uri="{FF2B5EF4-FFF2-40B4-BE49-F238E27FC236}">
+                <a16:creationId xmlns:a16="http://schemas.microsoft.com/office/drawing/2014/main" id="{D02A3AF5-01BB-450F-AC82-90DC06733970}"/>
+              </a:ext>
+            </a:extLst>
+          </p:cNvPr>
+          <p:cNvSpPr/>
+          <p:nvPr/>
+        </p:nvSpPr>
+        <p:spPr>
+          <a:xfrm>
+            <a:off x="7196831" y="3248087"/>
+            <a:ext cx="4509857" cy="3244788"/>
+          </a:xfrm>
+          <a:prstGeom prst="cloud">
+            <a:avLst/>
+          </a:prstGeom>
+        </p:spPr>
+        <p:style>
+          <a:lnRef idx="2">
+            <a:schemeClr val="accent1">
+              <a:shade val="50000"/>
+            </a:schemeClr>
+          </a:lnRef>
+          <a:fillRef idx="1">
+            <a:schemeClr val="accent1"/>
+          </a:fillRef>
+          <a:effectRef idx="0">
+            <a:schemeClr val="accent1"/>
+          </a:effectRef>
+          <a:fontRef idx="minor">
+            <a:schemeClr val="lt1"/>
+          </a:fontRef>
+        </p:style>
+        <p:txBody>
+          <a:bodyPr rtlCol="0" anchor="ctr"/>
+          <a:lstStyle/>
+          <a:p>
+            <a:pPr algn="ctr"/>
+            <a:r>
+              <a:rPr lang="en-US" dirty="0"/>
+              <a:t>Heap</a:t>
+            </a:r>
+          </a:p>
+        </p:txBody>
+      </p:sp>
+      <p:sp>
+        <p:nvSpPr>
+          <p:cNvPr id="5" name="Cylinder 4">
+            <a:extLst>
+              <a:ext uri="{FF2B5EF4-FFF2-40B4-BE49-F238E27FC236}">
+                <a16:creationId xmlns:a16="http://schemas.microsoft.com/office/drawing/2014/main" id="{3E68A659-24A5-424B-94B2-0CB5ED467D47}"/>
+              </a:ext>
+            </a:extLst>
+          </p:cNvPr>
+          <p:cNvSpPr/>
+          <p:nvPr/>
+        </p:nvSpPr>
+        <p:spPr>
+          <a:xfrm>
+            <a:off x="2127682" y="2938509"/>
+            <a:ext cx="2849732" cy="3755254"/>
+          </a:xfrm>
+          <a:prstGeom prst="can">
+            <a:avLst/>
+          </a:prstGeom>
+        </p:spPr>
+        <p:style>
+          <a:lnRef idx="2">
+            <a:schemeClr val="accent1">
+              <a:shade val="50000"/>
+            </a:schemeClr>
+          </a:lnRef>
+          <a:fillRef idx="1">
+            <a:schemeClr val="accent1"/>
+          </a:fillRef>
+          <a:effectRef idx="0">
+            <a:schemeClr val="accent1"/>
+          </a:effectRef>
+          <a:fontRef idx="minor">
+            <a:schemeClr val="lt1"/>
+          </a:fontRef>
+        </p:style>
+        <p:txBody>
+          <a:bodyPr rtlCol="0" anchor="ctr"/>
+          <a:lstStyle/>
+          <a:p>
+            <a:pPr algn="ctr"/>
+            <a:r>
+              <a:rPr lang="en-US" dirty="0"/>
+              <a:t>Stack</a:t>
+            </a:r>
+          </a:p>
+        </p:txBody>
+      </p:sp>
+      <p:sp>
+        <p:nvSpPr>
+          <p:cNvPr id="6" name="TextBox 5">
+            <a:extLst>
+              <a:ext uri="{FF2B5EF4-FFF2-40B4-BE49-F238E27FC236}">
+                <a16:creationId xmlns:a16="http://schemas.microsoft.com/office/drawing/2014/main" id="{045C2D4D-1E6E-46D8-839A-199BC03F4E64}"/>
+              </a:ext>
+            </a:extLst>
+          </p:cNvPr>
+          <p:cNvSpPr txBox="1"/>
+          <p:nvPr/>
+        </p:nvSpPr>
+        <p:spPr>
+          <a:xfrm>
+            <a:off x="5131293" y="514905"/>
+            <a:ext cx="6027938" cy="369332"/>
+          </a:xfrm>
+          <a:prstGeom prst="rect">
+            <a:avLst/>
+          </a:prstGeom>
+          <a:noFill/>
+        </p:spPr>
+        <p:txBody>
+          <a:bodyPr wrap="square" rtlCol="0">
+            <a:spAutoFit/>
+          </a:bodyPr>
+          <a:lstStyle/>
+          <a:p>
+            <a:r>
+              <a:rPr lang="en-US" dirty="0" err="1"/>
+              <a:t>BankAccount</a:t>
+            </a:r>
+            <a:r>
+              <a:rPr lang="en-US" dirty="0"/>
+              <a:t> </a:t>
+            </a:r>
+            <a:r>
+              <a:rPr lang="en-US" dirty="0" err="1"/>
+              <a:t>bankAccount</a:t>
+            </a:r>
+            <a:r>
+              <a:rPr lang="en-US" dirty="0"/>
+              <a:t> = new </a:t>
+            </a:r>
+            <a:r>
+              <a:rPr lang="en-US" dirty="0" err="1"/>
+              <a:t>BankAccount</a:t>
+            </a:r>
+            <a:r>
+              <a:rPr lang="en-US" dirty="0"/>
+              <a:t>();</a:t>
+            </a:r>
+          </a:p>
+        </p:txBody>
+      </p:sp>
+      <p:cxnSp>
+        <p:nvCxnSpPr>
+          <p:cNvPr id="8" name="Straight Arrow Connector 7">
+            <a:extLst>
+              <a:ext uri="{FF2B5EF4-FFF2-40B4-BE49-F238E27FC236}">
+                <a16:creationId xmlns:a16="http://schemas.microsoft.com/office/drawing/2014/main" id="{B688EDF6-DB43-4FE4-908C-E233DD4FD131}"/>
+              </a:ext>
+            </a:extLst>
+          </p:cNvPr>
+          <p:cNvCxnSpPr/>
+          <p:nvPr/>
+        </p:nvCxnSpPr>
+        <p:spPr>
+          <a:xfrm flipH="1">
+            <a:off x="4811697" y="884237"/>
+            <a:ext cx="1651247" cy="2293969"/>
+          </a:xfrm>
+          <a:prstGeom prst="straightConnector1">
+            <a:avLst/>
+          </a:prstGeom>
+          <a:ln>
+            <a:tailEnd type="triangle"/>
+          </a:ln>
+        </p:spPr>
+        <p:style>
+          <a:lnRef idx="1">
+            <a:schemeClr val="accent1"/>
+          </a:lnRef>
+          <a:fillRef idx="0">
+            <a:schemeClr val="accent1"/>
+          </a:fillRef>
+          <a:effectRef idx="0">
+            <a:schemeClr val="accent1"/>
+          </a:effectRef>
+          <a:fontRef idx="minor">
+            <a:schemeClr val="tx1"/>
+          </a:fontRef>
+        </p:style>
+      </p:cxnSp>
+      <p:cxnSp>
+        <p:nvCxnSpPr>
+          <p:cNvPr id="10" name="Straight Arrow Connector 9">
+            <a:extLst>
+              <a:ext uri="{FF2B5EF4-FFF2-40B4-BE49-F238E27FC236}">
+                <a16:creationId xmlns:a16="http://schemas.microsoft.com/office/drawing/2014/main" id="{63604AEF-7F40-43B8-84A6-9F736A69B5E2}"/>
+              </a:ext>
+            </a:extLst>
+          </p:cNvPr>
+          <p:cNvCxnSpPr/>
+          <p:nvPr/>
+        </p:nvCxnSpPr>
+        <p:spPr>
+          <a:xfrm>
+            <a:off x="9223899" y="994299"/>
+            <a:ext cx="150920" cy="1944210"/>
+          </a:xfrm>
+          <a:prstGeom prst="straightConnector1">
+            <a:avLst/>
+          </a:prstGeom>
+          <a:ln>
+            <a:tailEnd type="triangle"/>
+          </a:ln>
+        </p:spPr>
+        <p:style>
+          <a:lnRef idx="1">
+            <a:schemeClr val="accent1"/>
+          </a:lnRef>
+          <a:fillRef idx="0">
+            <a:schemeClr val="accent1"/>
+          </a:fillRef>
+          <a:effectRef idx="0">
+            <a:schemeClr val="accent1"/>
+          </a:effectRef>
+          <a:fontRef idx="minor">
+            <a:schemeClr val="tx1"/>
+          </a:fontRef>
+        </p:style>
+      </p:cxnSp>
+      <p:sp>
+        <p:nvSpPr>
+          <p:cNvPr id="11" name="Rectangle: Rounded Corners 10">
+            <a:extLst>
+              <a:ext uri="{FF2B5EF4-FFF2-40B4-BE49-F238E27FC236}">
+                <a16:creationId xmlns:a16="http://schemas.microsoft.com/office/drawing/2014/main" id="{C0B62521-3041-4994-8048-15CD5868979C}"/>
+              </a:ext>
+            </a:extLst>
+          </p:cNvPr>
+          <p:cNvSpPr/>
+          <p:nvPr/>
+        </p:nvSpPr>
+        <p:spPr>
+          <a:xfrm>
+            <a:off x="2642586" y="6242535"/>
+            <a:ext cx="1819923" cy="250340"/>
+          </a:xfrm>
+          <a:prstGeom prst="roundRect">
+            <a:avLst/>
+          </a:prstGeom>
+        </p:spPr>
+        <p:style>
+          <a:lnRef idx="2">
+            <a:schemeClr val="accent4">
+              <a:shade val="50000"/>
+            </a:schemeClr>
+          </a:lnRef>
+          <a:fillRef idx="1">
+            <a:schemeClr val="accent4"/>
+          </a:fillRef>
+          <a:effectRef idx="0">
+            <a:schemeClr val="accent4"/>
+          </a:effectRef>
+          <a:fontRef idx="minor">
+            <a:schemeClr val="lt1"/>
+          </a:fontRef>
+        </p:style>
+        <p:txBody>
+          <a:bodyPr rtlCol="0" anchor="ctr"/>
+          <a:lstStyle/>
+          <a:p>
+            <a:pPr algn="ctr"/>
+            <a:r>
+              <a:rPr lang="en-US" dirty="0"/>
+              <a:t>Main method</a:t>
+            </a:r>
+          </a:p>
+        </p:txBody>
+      </p:sp>
+      <p:sp>
+        <p:nvSpPr>
+          <p:cNvPr id="13" name="Rectangle: Rounded Corners 12">
+            <a:extLst>
+              <a:ext uri="{FF2B5EF4-FFF2-40B4-BE49-F238E27FC236}">
+                <a16:creationId xmlns:a16="http://schemas.microsoft.com/office/drawing/2014/main" id="{FEE8A817-79B6-48AE-8C9B-279A70C2D4D7}"/>
+              </a:ext>
+            </a:extLst>
+          </p:cNvPr>
+          <p:cNvSpPr/>
+          <p:nvPr/>
+        </p:nvSpPr>
+        <p:spPr>
+          <a:xfrm>
+            <a:off x="2642586" y="6006648"/>
+            <a:ext cx="1819923" cy="250340"/>
+          </a:xfrm>
+          <a:prstGeom prst="roundRect">
+            <a:avLst/>
+          </a:prstGeom>
+        </p:spPr>
+        <p:style>
+          <a:lnRef idx="2">
+            <a:schemeClr val="accent4">
+              <a:shade val="50000"/>
+            </a:schemeClr>
+          </a:lnRef>
+          <a:fillRef idx="1">
+            <a:schemeClr val="accent4"/>
+          </a:fillRef>
+          <a:effectRef idx="0">
+            <a:schemeClr val="accent4"/>
+          </a:effectRef>
+          <a:fontRef idx="minor">
+            <a:schemeClr val="lt1"/>
+          </a:fontRef>
+        </p:style>
+        <p:txBody>
+          <a:bodyPr rtlCol="0" anchor="ctr"/>
+          <a:lstStyle/>
+          <a:p>
+            <a:pPr algn="ctr"/>
+            <a:r>
+              <a:rPr lang="en-US" dirty="0"/>
+              <a:t>A()</a:t>
+            </a:r>
+          </a:p>
+        </p:txBody>
+      </p:sp>
+      <p:sp>
+        <p:nvSpPr>
+          <p:cNvPr id="15" name="Rectangle: Rounded Corners 14">
+            <a:extLst>
+              <a:ext uri="{FF2B5EF4-FFF2-40B4-BE49-F238E27FC236}">
+                <a16:creationId xmlns:a16="http://schemas.microsoft.com/office/drawing/2014/main" id="{D2D1EF55-E1E8-4C7C-97F6-D1023731A886}"/>
+              </a:ext>
+            </a:extLst>
+          </p:cNvPr>
+          <p:cNvSpPr/>
+          <p:nvPr/>
+        </p:nvSpPr>
+        <p:spPr>
+          <a:xfrm>
+            <a:off x="2642586" y="5769878"/>
+            <a:ext cx="1819923" cy="250340"/>
+          </a:xfrm>
+          <a:prstGeom prst="roundRect">
+            <a:avLst/>
+          </a:prstGeom>
+        </p:spPr>
+        <p:style>
+          <a:lnRef idx="2">
+            <a:schemeClr val="accent4">
+              <a:shade val="50000"/>
+            </a:schemeClr>
+          </a:lnRef>
+          <a:fillRef idx="1">
+            <a:schemeClr val="accent4"/>
+          </a:fillRef>
+          <a:effectRef idx="0">
+            <a:schemeClr val="accent4"/>
+          </a:effectRef>
+          <a:fontRef idx="minor">
+            <a:schemeClr val="lt1"/>
+          </a:fontRef>
+        </p:style>
+        <p:txBody>
+          <a:bodyPr rtlCol="0" anchor="ctr"/>
+          <a:lstStyle/>
+          <a:p>
+            <a:pPr algn="ctr"/>
+            <a:r>
+              <a:rPr lang="en-US" dirty="0"/>
+              <a:t>A’s reference var</a:t>
+            </a:r>
+          </a:p>
+        </p:txBody>
+      </p:sp>
+      <p:sp>
+        <p:nvSpPr>
+          <p:cNvPr id="17" name="Rectangle: Rounded Corners 16">
+            <a:extLst>
+              <a:ext uri="{FF2B5EF4-FFF2-40B4-BE49-F238E27FC236}">
+                <a16:creationId xmlns:a16="http://schemas.microsoft.com/office/drawing/2014/main" id="{8BD0D36E-2E65-4323-B119-7A5FF510B14E}"/>
+              </a:ext>
+            </a:extLst>
+          </p:cNvPr>
+          <p:cNvSpPr/>
+          <p:nvPr/>
+        </p:nvSpPr>
+        <p:spPr>
+          <a:xfrm>
+            <a:off x="2642586" y="5555420"/>
+            <a:ext cx="1819923" cy="250340"/>
+          </a:xfrm>
+          <a:prstGeom prst="roundRect">
+            <a:avLst/>
+          </a:prstGeom>
+        </p:spPr>
+        <p:style>
+          <a:lnRef idx="2">
+            <a:schemeClr val="accent4">
+              <a:shade val="50000"/>
+            </a:schemeClr>
+          </a:lnRef>
+          <a:fillRef idx="1">
+            <a:schemeClr val="accent4"/>
+          </a:fillRef>
+          <a:effectRef idx="0">
+            <a:schemeClr val="accent4"/>
+          </a:effectRef>
+          <a:fontRef idx="minor">
+            <a:schemeClr val="lt1"/>
+          </a:fontRef>
+        </p:style>
+        <p:txBody>
+          <a:bodyPr rtlCol="0" anchor="ctr"/>
+          <a:lstStyle/>
+          <a:p>
+            <a:pPr algn="ctr"/>
+            <a:r>
+              <a:rPr lang="en-US" dirty="0"/>
+              <a:t>B()</a:t>
+            </a:r>
+          </a:p>
+        </p:txBody>
+      </p:sp>
+      <p:sp>
+        <p:nvSpPr>
+          <p:cNvPr id="19" name="Rectangle: Rounded Corners 18">
+            <a:extLst>
+              <a:ext uri="{FF2B5EF4-FFF2-40B4-BE49-F238E27FC236}">
+                <a16:creationId xmlns:a16="http://schemas.microsoft.com/office/drawing/2014/main" id="{56F43A2F-2621-4D7B-B86B-B70B9CDBD3EF}"/>
+              </a:ext>
+            </a:extLst>
+          </p:cNvPr>
+          <p:cNvSpPr/>
+          <p:nvPr/>
+        </p:nvSpPr>
+        <p:spPr>
+          <a:xfrm>
+            <a:off x="2642585" y="5305080"/>
+            <a:ext cx="1819923" cy="250340"/>
+          </a:xfrm>
+          <a:prstGeom prst="roundRect">
+            <a:avLst/>
+          </a:prstGeom>
+        </p:spPr>
+        <p:style>
+          <a:lnRef idx="2">
+            <a:schemeClr val="accent4">
+              <a:shade val="50000"/>
+            </a:schemeClr>
+          </a:lnRef>
+          <a:fillRef idx="1">
+            <a:schemeClr val="accent4"/>
+          </a:fillRef>
+          <a:effectRef idx="0">
+            <a:schemeClr val="accent4"/>
+          </a:effectRef>
+          <a:fontRef idx="minor">
+            <a:schemeClr val="lt1"/>
+          </a:fontRef>
+        </p:style>
+        <p:txBody>
+          <a:bodyPr rtlCol="0" anchor="ctr"/>
+          <a:lstStyle/>
+          <a:p>
+            <a:pPr algn="ctr"/>
+            <a:r>
+              <a:rPr lang="en-US" dirty="0"/>
+              <a:t>B’s reference var</a:t>
+            </a:r>
+          </a:p>
+        </p:txBody>
+      </p:sp>
+      <p:sp>
+        <p:nvSpPr>
+          <p:cNvPr id="22" name="Oval 21">
+            <a:extLst>
+              <a:ext uri="{FF2B5EF4-FFF2-40B4-BE49-F238E27FC236}">
+                <a16:creationId xmlns:a16="http://schemas.microsoft.com/office/drawing/2014/main" id="{B1ECA342-17B8-4ABB-B45C-2B1BBD30E12D}"/>
+              </a:ext>
+            </a:extLst>
+          </p:cNvPr>
+          <p:cNvSpPr/>
+          <p:nvPr/>
+        </p:nvSpPr>
+        <p:spPr>
+          <a:xfrm>
+            <a:off x="8563993" y="4003829"/>
+            <a:ext cx="340311" cy="313509"/>
+          </a:xfrm>
+          <a:prstGeom prst="ellipse">
+            <a:avLst/>
+          </a:prstGeom>
+        </p:spPr>
+        <p:style>
+          <a:lnRef idx="2">
+            <a:schemeClr val="accent6">
+              <a:shade val="50000"/>
+            </a:schemeClr>
+          </a:lnRef>
+          <a:fillRef idx="1">
+            <a:schemeClr val="accent6"/>
+          </a:fillRef>
+          <a:effectRef idx="0">
+            <a:schemeClr val="accent6"/>
+          </a:effectRef>
+          <a:fontRef idx="minor">
+            <a:schemeClr val="lt1"/>
+          </a:fontRef>
+        </p:style>
+        <p:txBody>
+          <a:bodyPr rtlCol="0" anchor="ctr"/>
+          <a:lstStyle/>
+          <a:p>
+            <a:pPr algn="ctr"/>
+            <a:endParaRPr lang="en-US"/>
+          </a:p>
+        </p:txBody>
+      </p:sp>
+      <p:sp>
+        <p:nvSpPr>
+          <p:cNvPr id="24" name="Oval 23">
+            <a:extLst>
+              <a:ext uri="{FF2B5EF4-FFF2-40B4-BE49-F238E27FC236}">
+                <a16:creationId xmlns:a16="http://schemas.microsoft.com/office/drawing/2014/main" id="{464878FB-4ABD-429B-B225-D50F55943BF4}"/>
+              </a:ext>
+            </a:extLst>
+          </p:cNvPr>
+          <p:cNvSpPr/>
+          <p:nvPr/>
+        </p:nvSpPr>
+        <p:spPr>
+          <a:xfrm>
+            <a:off x="8223682" y="5390225"/>
+            <a:ext cx="340311" cy="313509"/>
+          </a:xfrm>
+          <a:prstGeom prst="ellipse">
+            <a:avLst/>
+          </a:prstGeom>
+        </p:spPr>
+        <p:style>
+          <a:lnRef idx="2">
+            <a:schemeClr val="accent6">
+              <a:shade val="50000"/>
+            </a:schemeClr>
+          </a:lnRef>
+          <a:fillRef idx="1">
+            <a:schemeClr val="accent6"/>
+          </a:fillRef>
+          <a:effectRef idx="0">
+            <a:schemeClr val="accent6"/>
+          </a:effectRef>
+          <a:fontRef idx="minor">
+            <a:schemeClr val="lt1"/>
+          </a:fontRef>
+        </p:style>
+        <p:txBody>
+          <a:bodyPr rtlCol="0" anchor="ctr"/>
+          <a:lstStyle/>
+          <a:p>
+            <a:pPr algn="ctr"/>
+            <a:endParaRPr lang="en-US"/>
+          </a:p>
+        </p:txBody>
+      </p:sp>
+      <p:sp>
+        <p:nvSpPr>
+          <p:cNvPr id="26" name="Oval 25">
+            <a:extLst>
+              <a:ext uri="{FF2B5EF4-FFF2-40B4-BE49-F238E27FC236}">
+                <a16:creationId xmlns:a16="http://schemas.microsoft.com/office/drawing/2014/main" id="{D5A95AE2-F479-4605-98CB-706472B337D4}"/>
+              </a:ext>
+            </a:extLst>
+          </p:cNvPr>
+          <p:cNvSpPr/>
+          <p:nvPr/>
+        </p:nvSpPr>
+        <p:spPr>
+          <a:xfrm>
+            <a:off x="9894162" y="3775969"/>
+            <a:ext cx="340311" cy="313509"/>
+          </a:xfrm>
+          <a:prstGeom prst="ellipse">
+            <a:avLst/>
+          </a:prstGeom>
+        </p:spPr>
+        <p:style>
+          <a:lnRef idx="2">
+            <a:schemeClr val="accent6">
+              <a:shade val="50000"/>
+            </a:schemeClr>
+          </a:lnRef>
+          <a:fillRef idx="1">
+            <a:schemeClr val="accent6"/>
+          </a:fillRef>
+          <a:effectRef idx="0">
+            <a:schemeClr val="accent6"/>
+          </a:effectRef>
+          <a:fontRef idx="minor">
+            <a:schemeClr val="lt1"/>
+          </a:fontRef>
+        </p:style>
+        <p:txBody>
+          <a:bodyPr rtlCol="0" anchor="ctr"/>
+          <a:lstStyle/>
+          <a:p>
+            <a:pPr algn="ctr"/>
+            <a:endParaRPr lang="en-US"/>
+          </a:p>
+        </p:txBody>
+      </p:sp>
+    </p:spTree>
+    <p:extLst>
+      <p:ext uri="{BB962C8B-B14F-4D97-AF65-F5344CB8AC3E}">
+        <p14:creationId xmlns:p14="http://schemas.microsoft.com/office/powerpoint/2010/main" val="1779602266"/>
+      </p:ext>
+    </p:extLst>
+  </p:cSld>
+  <p:clrMapOvr>
+    <a:masterClrMapping/>
+  </p:clrMapOvr>
+</p:sld>
+</file>
+
+<file path=ppt/slides/slide5.xml><?xml version="1.0" encoding="utf-8"?>
+<p:sld xmlns:a="http://schemas.openxmlformats.org/drawingml/2006/main" xmlns:r="http://schemas.openxmlformats.org/officeDocument/2006/relationships" xmlns:p="http://schemas.openxmlformats.org/presentationml/2006/main">
+  <p:cSld>
+    <p:spTree>
+      <p:nvGrpSpPr>
+        <p:cNvPr id="1" name=""/>
+        <p:cNvGrpSpPr/>
+        <p:nvPr/>
+      </p:nvGrpSpPr>
+      <p:grpSpPr>
+        <a:xfrm>
+          <a:off x="0" y="0"/>
+          <a:ext cx="0" cy="0"/>
+          <a:chOff x="0" y="0"/>
+          <a:chExt cx="0" cy="0"/>
+        </a:xfrm>
+      </p:grpSpPr>
+      <p:sp>
+        <p:nvSpPr>
+          <p:cNvPr id="2" name="Title 1">
+            <a:extLst>
+              <a:ext uri="{FF2B5EF4-FFF2-40B4-BE49-F238E27FC236}">
+                <a16:creationId xmlns:a16="http://schemas.microsoft.com/office/drawing/2014/main" id="{31A954B4-1309-4236-846F-E41FA8E87326}"/>
+              </a:ext>
+            </a:extLst>
+          </p:cNvPr>
+          <p:cNvSpPr>
+            <a:spLocks noGrp="1"/>
+          </p:cNvSpPr>
+          <p:nvPr>
+            <p:ph type="title"/>
+          </p:nvPr>
+        </p:nvSpPr>
+        <p:spPr/>
+        <p:txBody>
+          <a:bodyPr/>
+          <a:lstStyle/>
+          <a:p>
+            <a:r>
+              <a:rPr lang="en-US" dirty="0"/>
+              <a:t>String Pool</a:t>
+            </a:r>
+          </a:p>
+        </p:txBody>
+      </p:sp>
+      <p:sp>
+        <p:nvSpPr>
+          <p:cNvPr id="4" name="Cloud 3">
+            <a:extLst>
+              <a:ext uri="{FF2B5EF4-FFF2-40B4-BE49-F238E27FC236}">
+                <a16:creationId xmlns:a16="http://schemas.microsoft.com/office/drawing/2014/main" id="{D02A3AF5-01BB-450F-AC82-90DC06733970}"/>
+              </a:ext>
+            </a:extLst>
+          </p:cNvPr>
+          <p:cNvSpPr/>
+          <p:nvPr/>
+        </p:nvSpPr>
+        <p:spPr>
+          <a:xfrm>
+            <a:off x="7196831" y="3248087"/>
+            <a:ext cx="4509857" cy="3244788"/>
+          </a:xfrm>
+          <a:prstGeom prst="cloud">
+            <a:avLst/>
+          </a:prstGeom>
+        </p:spPr>
+        <p:style>
+          <a:lnRef idx="2">
+            <a:schemeClr val="accent1">
+              <a:shade val="50000"/>
+            </a:schemeClr>
+          </a:lnRef>
+          <a:fillRef idx="1">
+            <a:schemeClr val="accent1"/>
+          </a:fillRef>
+          <a:effectRef idx="0">
+            <a:schemeClr val="accent1"/>
+          </a:effectRef>
+          <a:fontRef idx="minor">
+            <a:schemeClr val="lt1"/>
+          </a:fontRef>
+        </p:style>
+        <p:txBody>
+          <a:bodyPr rtlCol="0" anchor="ctr"/>
+          <a:lstStyle/>
+          <a:p>
+            <a:pPr algn="ctr"/>
+            <a:r>
+              <a:rPr lang="en-US" dirty="0"/>
+              <a:t>Heap</a:t>
+            </a:r>
+          </a:p>
+        </p:txBody>
+      </p:sp>
+      <p:sp>
+        <p:nvSpPr>
+          <p:cNvPr id="5" name="Cylinder 4">
+            <a:extLst>
+              <a:ext uri="{FF2B5EF4-FFF2-40B4-BE49-F238E27FC236}">
+                <a16:creationId xmlns:a16="http://schemas.microsoft.com/office/drawing/2014/main" id="{3E68A659-24A5-424B-94B2-0CB5ED467D47}"/>
+              </a:ext>
+            </a:extLst>
+          </p:cNvPr>
+          <p:cNvSpPr/>
+          <p:nvPr/>
+        </p:nvSpPr>
+        <p:spPr>
+          <a:xfrm>
+            <a:off x="2127682" y="2938509"/>
+            <a:ext cx="2849732" cy="3755254"/>
+          </a:xfrm>
+          <a:prstGeom prst="can">
+            <a:avLst/>
+          </a:prstGeom>
+        </p:spPr>
+        <p:style>
+          <a:lnRef idx="2">
+            <a:schemeClr val="accent1">
+              <a:shade val="50000"/>
+            </a:schemeClr>
+          </a:lnRef>
+          <a:fillRef idx="1">
+            <a:schemeClr val="accent1"/>
+          </a:fillRef>
+          <a:effectRef idx="0">
+            <a:schemeClr val="accent1"/>
+          </a:effectRef>
+          <a:fontRef idx="minor">
+            <a:schemeClr val="lt1"/>
+          </a:fontRef>
+        </p:style>
+        <p:txBody>
+          <a:bodyPr rtlCol="0" anchor="ctr"/>
+          <a:lstStyle/>
+          <a:p>
+            <a:pPr algn="ctr"/>
+            <a:r>
+              <a:rPr lang="en-US" dirty="0"/>
+              <a:t>Stack</a:t>
+            </a:r>
+          </a:p>
+        </p:txBody>
+      </p:sp>
+      <p:sp>
+        <p:nvSpPr>
+          <p:cNvPr id="11" name="Rectangle: Rounded Corners 10">
+            <a:extLst>
+              <a:ext uri="{FF2B5EF4-FFF2-40B4-BE49-F238E27FC236}">
+                <a16:creationId xmlns:a16="http://schemas.microsoft.com/office/drawing/2014/main" id="{C0B62521-3041-4994-8048-15CD5868979C}"/>
+              </a:ext>
+            </a:extLst>
+          </p:cNvPr>
+          <p:cNvSpPr/>
+          <p:nvPr/>
+        </p:nvSpPr>
+        <p:spPr>
+          <a:xfrm>
+            <a:off x="2642586" y="6242535"/>
+            <a:ext cx="1819923" cy="250340"/>
+          </a:xfrm>
+          <a:prstGeom prst="roundRect">
+            <a:avLst/>
+          </a:prstGeom>
+        </p:spPr>
+        <p:style>
+          <a:lnRef idx="2">
+            <a:schemeClr val="accent4">
+              <a:shade val="50000"/>
+            </a:schemeClr>
+          </a:lnRef>
+          <a:fillRef idx="1">
+            <a:schemeClr val="accent4"/>
+          </a:fillRef>
+          <a:effectRef idx="0">
+            <a:schemeClr val="accent4"/>
+          </a:effectRef>
+          <a:fontRef idx="minor">
+            <a:schemeClr val="lt1"/>
+          </a:fontRef>
+        </p:style>
+        <p:txBody>
+          <a:bodyPr rtlCol="0" anchor="ctr"/>
+          <a:lstStyle/>
+          <a:p>
+            <a:pPr algn="ctr"/>
+            <a:r>
+              <a:rPr lang="en-US" dirty="0"/>
+              <a:t>Main method</a:t>
+            </a:r>
+          </a:p>
+        </p:txBody>
+      </p:sp>
+      <p:sp>
+        <p:nvSpPr>
+          <p:cNvPr id="13" name="Rectangle: Rounded Corners 12">
+            <a:extLst>
+              <a:ext uri="{FF2B5EF4-FFF2-40B4-BE49-F238E27FC236}">
+                <a16:creationId xmlns:a16="http://schemas.microsoft.com/office/drawing/2014/main" id="{FEE8A817-79B6-48AE-8C9B-279A70C2D4D7}"/>
+              </a:ext>
+            </a:extLst>
+          </p:cNvPr>
+          <p:cNvSpPr/>
+          <p:nvPr/>
+        </p:nvSpPr>
+        <p:spPr>
+          <a:xfrm>
+            <a:off x="2642586" y="6006648"/>
+            <a:ext cx="1819923" cy="250340"/>
+          </a:xfrm>
+          <a:prstGeom prst="roundRect">
+            <a:avLst/>
+          </a:prstGeom>
+        </p:spPr>
+        <p:style>
+          <a:lnRef idx="2">
+            <a:schemeClr val="accent4">
+              <a:shade val="50000"/>
+            </a:schemeClr>
+          </a:lnRef>
+          <a:fillRef idx="1">
+            <a:schemeClr val="accent4"/>
+          </a:fillRef>
+          <a:effectRef idx="0">
+            <a:schemeClr val="accent4"/>
+          </a:effectRef>
+          <a:fontRef idx="minor">
+            <a:schemeClr val="lt1"/>
+          </a:fontRef>
+        </p:style>
+        <p:txBody>
+          <a:bodyPr rtlCol="0" anchor="ctr"/>
+          <a:lstStyle/>
+          <a:p>
+            <a:pPr algn="ctr"/>
+            <a:r>
+              <a:rPr lang="en-US" dirty="0"/>
+              <a:t>A()</a:t>
+            </a:r>
+          </a:p>
+        </p:txBody>
+      </p:sp>
+      <p:sp>
+        <p:nvSpPr>
+          <p:cNvPr id="15" name="Rectangle: Rounded Corners 14">
+            <a:extLst>
+              <a:ext uri="{FF2B5EF4-FFF2-40B4-BE49-F238E27FC236}">
+                <a16:creationId xmlns:a16="http://schemas.microsoft.com/office/drawing/2014/main" id="{D2D1EF55-E1E8-4C7C-97F6-D1023731A886}"/>
+              </a:ext>
+            </a:extLst>
+          </p:cNvPr>
+          <p:cNvSpPr/>
+          <p:nvPr/>
+        </p:nvSpPr>
+        <p:spPr>
+          <a:xfrm>
+            <a:off x="2642586" y="5769878"/>
+            <a:ext cx="1819923" cy="250340"/>
+          </a:xfrm>
+          <a:prstGeom prst="roundRect">
+            <a:avLst/>
+          </a:prstGeom>
+        </p:spPr>
+        <p:style>
+          <a:lnRef idx="2">
+            <a:schemeClr val="accent4">
+              <a:shade val="50000"/>
+            </a:schemeClr>
+          </a:lnRef>
+          <a:fillRef idx="1">
+            <a:schemeClr val="accent4"/>
+          </a:fillRef>
+          <a:effectRef idx="0">
+            <a:schemeClr val="accent4"/>
+          </a:effectRef>
+          <a:fontRef idx="minor">
+            <a:schemeClr val="lt1"/>
+          </a:fontRef>
+        </p:style>
+        <p:txBody>
+          <a:bodyPr rtlCol="0" anchor="ctr"/>
+          <a:lstStyle/>
+          <a:p>
+            <a:pPr algn="ctr"/>
+            <a:r>
+              <a:rPr lang="en-US" dirty="0"/>
+              <a:t>A’s reference var</a:t>
+            </a:r>
+          </a:p>
+        </p:txBody>
+      </p:sp>
+      <p:sp>
+        <p:nvSpPr>
+          <p:cNvPr id="17" name="Rectangle: Rounded Corners 16">
+            <a:extLst>
+              <a:ext uri="{FF2B5EF4-FFF2-40B4-BE49-F238E27FC236}">
+                <a16:creationId xmlns:a16="http://schemas.microsoft.com/office/drawing/2014/main" id="{8BD0D36E-2E65-4323-B119-7A5FF510B14E}"/>
+              </a:ext>
+            </a:extLst>
+          </p:cNvPr>
+          <p:cNvSpPr/>
+          <p:nvPr/>
+        </p:nvSpPr>
+        <p:spPr>
+          <a:xfrm>
+            <a:off x="2642586" y="5555420"/>
+            <a:ext cx="1819923" cy="250340"/>
+          </a:xfrm>
+          <a:prstGeom prst="roundRect">
+            <a:avLst/>
+          </a:prstGeom>
+        </p:spPr>
+        <p:style>
+          <a:lnRef idx="2">
+            <a:schemeClr val="accent4">
+              <a:shade val="50000"/>
+            </a:schemeClr>
+          </a:lnRef>
+          <a:fillRef idx="1">
+            <a:schemeClr val="accent4"/>
+          </a:fillRef>
+          <a:effectRef idx="0">
+            <a:schemeClr val="accent4"/>
+          </a:effectRef>
+          <a:fontRef idx="minor">
+            <a:schemeClr val="lt1"/>
+          </a:fontRef>
+        </p:style>
+        <p:txBody>
+          <a:bodyPr rtlCol="0" anchor="ctr"/>
+          <a:lstStyle/>
+          <a:p>
+            <a:pPr algn="ctr"/>
+            <a:r>
+              <a:rPr lang="en-US" dirty="0"/>
+              <a:t>B()</a:t>
+            </a:r>
+          </a:p>
+        </p:txBody>
+      </p:sp>
+      <p:sp>
+        <p:nvSpPr>
+          <p:cNvPr id="19" name="Rectangle: Rounded Corners 18">
+            <a:extLst>
+              <a:ext uri="{FF2B5EF4-FFF2-40B4-BE49-F238E27FC236}">
+                <a16:creationId xmlns:a16="http://schemas.microsoft.com/office/drawing/2014/main" id="{56F43A2F-2621-4D7B-B86B-B70B9CDBD3EF}"/>
+              </a:ext>
+            </a:extLst>
+          </p:cNvPr>
+          <p:cNvSpPr/>
+          <p:nvPr/>
+        </p:nvSpPr>
+        <p:spPr>
+          <a:xfrm>
+            <a:off x="2642585" y="5305080"/>
+            <a:ext cx="1819923" cy="250340"/>
+          </a:xfrm>
+          <a:prstGeom prst="roundRect">
+            <a:avLst/>
+          </a:prstGeom>
+        </p:spPr>
+        <p:style>
+          <a:lnRef idx="2">
+            <a:schemeClr val="accent4">
+              <a:shade val="50000"/>
+            </a:schemeClr>
+          </a:lnRef>
+          <a:fillRef idx="1">
+            <a:schemeClr val="accent4"/>
+          </a:fillRef>
+          <a:effectRef idx="0">
+            <a:schemeClr val="accent4"/>
+          </a:effectRef>
+          <a:fontRef idx="minor">
+            <a:schemeClr val="lt1"/>
+          </a:fontRef>
+        </p:style>
+        <p:txBody>
+          <a:bodyPr rtlCol="0" anchor="ctr"/>
+          <a:lstStyle/>
+          <a:p>
+            <a:pPr algn="ctr"/>
+            <a:r>
+              <a:rPr lang="en-US" dirty="0"/>
+              <a:t>B’s reference var</a:t>
+            </a:r>
+          </a:p>
+        </p:txBody>
+      </p:sp>
+      <p:sp>
+        <p:nvSpPr>
+          <p:cNvPr id="3" name="Cloud 2">
+            <a:extLst>
+              <a:ext uri="{FF2B5EF4-FFF2-40B4-BE49-F238E27FC236}">
+                <a16:creationId xmlns:a16="http://schemas.microsoft.com/office/drawing/2014/main" id="{01AC3C2B-73AA-482D-98B6-0CC1A6150E4A}"/>
+              </a:ext>
+            </a:extLst>
+          </p:cNvPr>
+          <p:cNvSpPr/>
+          <p:nvPr/>
+        </p:nvSpPr>
+        <p:spPr>
+          <a:xfrm>
+            <a:off x="9747681" y="4125233"/>
+            <a:ext cx="1740023" cy="1305017"/>
+          </a:xfrm>
+          <a:prstGeom prst="cloud">
+            <a:avLst/>
+          </a:prstGeom>
+        </p:spPr>
+        <p:style>
+          <a:lnRef idx="2">
+            <a:schemeClr val="accent5">
+              <a:shade val="50000"/>
+            </a:schemeClr>
+          </a:lnRef>
+          <a:fillRef idx="1">
+            <a:schemeClr val="accent5"/>
+          </a:fillRef>
+          <a:effectRef idx="0">
+            <a:schemeClr val="accent5"/>
+          </a:effectRef>
+          <a:fontRef idx="minor">
+            <a:schemeClr val="lt1"/>
+          </a:fontRef>
+        </p:style>
+        <p:txBody>
+          <a:bodyPr rtlCol="0" anchor="ctr"/>
+          <a:lstStyle/>
+          <a:p>
+            <a:pPr algn="ctr"/>
+            <a:r>
+              <a:rPr lang="en-US" dirty="0"/>
+              <a:t>String Pool</a:t>
+            </a:r>
+          </a:p>
+        </p:txBody>
+      </p:sp>
+      <p:sp>
+        <p:nvSpPr>
+          <p:cNvPr id="7" name="Oval 6">
+            <a:extLst>
+              <a:ext uri="{FF2B5EF4-FFF2-40B4-BE49-F238E27FC236}">
+                <a16:creationId xmlns:a16="http://schemas.microsoft.com/office/drawing/2014/main" id="{1D7679D7-15D0-486A-A207-790311258347}"/>
+              </a:ext>
+            </a:extLst>
+          </p:cNvPr>
+          <p:cNvSpPr/>
+          <p:nvPr/>
+        </p:nvSpPr>
+        <p:spPr>
+          <a:xfrm>
+            <a:off x="10810042" y="4227326"/>
+            <a:ext cx="677662" cy="550415"/>
+          </a:xfrm>
+          <a:prstGeom prst="ellipse">
+            <a:avLst/>
+          </a:prstGeom>
+        </p:spPr>
+        <p:style>
+          <a:lnRef idx="2">
+            <a:schemeClr val="accent3">
+              <a:shade val="50000"/>
+            </a:schemeClr>
+          </a:lnRef>
+          <a:fillRef idx="1">
+            <a:schemeClr val="accent3"/>
+          </a:fillRef>
+          <a:effectRef idx="0">
+            <a:schemeClr val="accent3"/>
+          </a:effectRef>
+          <a:fontRef idx="minor">
+            <a:schemeClr val="lt1"/>
+          </a:fontRef>
+        </p:style>
+        <p:txBody>
+          <a:bodyPr rtlCol="0" anchor="ctr"/>
+          <a:lstStyle/>
+          <a:p>
+            <a:pPr algn="ctr"/>
+            <a:r>
+              <a:rPr lang="en-US" dirty="0"/>
+              <a:t>“s”</a:t>
+            </a:r>
+          </a:p>
+        </p:txBody>
+      </p:sp>
+      <p:sp>
+        <p:nvSpPr>
+          <p:cNvPr id="9" name="TextBox 8">
+            <a:extLst>
+              <a:ext uri="{FF2B5EF4-FFF2-40B4-BE49-F238E27FC236}">
+                <a16:creationId xmlns:a16="http://schemas.microsoft.com/office/drawing/2014/main" id="{60C84D28-AA85-4B0D-8EF0-5C002702C93F}"/>
+              </a:ext>
+            </a:extLst>
+          </p:cNvPr>
+          <p:cNvSpPr txBox="1"/>
+          <p:nvPr/>
+        </p:nvSpPr>
+        <p:spPr>
+          <a:xfrm>
+            <a:off x="5459767" y="230819"/>
+            <a:ext cx="3293616" cy="2031325"/>
+          </a:xfrm>
+          <a:prstGeom prst="rect">
+            <a:avLst/>
+          </a:prstGeom>
+          <a:noFill/>
+        </p:spPr>
+        <p:txBody>
+          <a:bodyPr wrap="square" rtlCol="0">
+            <a:spAutoFit/>
+          </a:bodyPr>
+          <a:lstStyle/>
+          <a:p>
+            <a:r>
+              <a:rPr lang="en-US" dirty="0"/>
+              <a:t>String s1 = “s”;</a:t>
+            </a:r>
+          </a:p>
+          <a:p>
+            <a:r>
+              <a:rPr lang="en-US" dirty="0"/>
+              <a:t>String s2 = “s”;</a:t>
+            </a:r>
+          </a:p>
+          <a:p>
+            <a:r>
+              <a:rPr lang="en-US" dirty="0"/>
+              <a:t>String s1 = “ss”;</a:t>
+            </a:r>
+          </a:p>
+          <a:p>
+            <a:r>
+              <a:rPr lang="en-US" dirty="0"/>
+              <a:t>String s3 = new String(“s”);</a:t>
+            </a:r>
+          </a:p>
+          <a:p>
+            <a:r>
+              <a:rPr lang="en-US" dirty="0"/>
+              <a:t>// the following is run 10x</a:t>
+            </a:r>
+          </a:p>
+          <a:p>
+            <a:r>
+              <a:rPr lang="en-US" dirty="0"/>
+              <a:t>String s4 = new String(“s”);</a:t>
+            </a:r>
+          </a:p>
+          <a:p>
+            <a:endParaRPr lang="en-US" dirty="0"/>
+          </a:p>
+        </p:txBody>
+      </p:sp>
+      <p:sp>
+        <p:nvSpPr>
+          <p:cNvPr id="12" name="Oval 11">
+            <a:extLst>
+              <a:ext uri="{FF2B5EF4-FFF2-40B4-BE49-F238E27FC236}">
+                <a16:creationId xmlns:a16="http://schemas.microsoft.com/office/drawing/2014/main" id="{490B9FEE-6FC9-4B33-A68D-F869C5FB4853}"/>
+              </a:ext>
+            </a:extLst>
+          </p:cNvPr>
+          <p:cNvSpPr/>
+          <p:nvPr/>
+        </p:nvSpPr>
+        <p:spPr>
+          <a:xfrm>
+            <a:off x="9747681" y="4930141"/>
+            <a:ext cx="887768" cy="550415"/>
+          </a:xfrm>
+          <a:prstGeom prst="ellipse">
+            <a:avLst/>
+          </a:prstGeom>
+        </p:spPr>
+        <p:style>
+          <a:lnRef idx="2">
+            <a:schemeClr val="accent3">
+              <a:shade val="50000"/>
+            </a:schemeClr>
+          </a:lnRef>
+          <a:fillRef idx="1">
+            <a:schemeClr val="accent3"/>
+          </a:fillRef>
+          <a:effectRef idx="0">
+            <a:schemeClr val="accent3"/>
+          </a:effectRef>
+          <a:fontRef idx="minor">
+            <a:schemeClr val="lt1"/>
+          </a:fontRef>
+        </p:style>
+        <p:txBody>
+          <a:bodyPr rtlCol="0" anchor="ctr"/>
+          <a:lstStyle/>
+          <a:p>
+            <a:pPr algn="ctr"/>
+            <a:r>
+              <a:rPr lang="en-US" dirty="0"/>
+              <a:t>“ss”</a:t>
+            </a:r>
+          </a:p>
+        </p:txBody>
+      </p:sp>
+      <p:sp>
+        <p:nvSpPr>
+          <p:cNvPr id="14" name="Oval 13">
+            <a:extLst>
+              <a:ext uri="{FF2B5EF4-FFF2-40B4-BE49-F238E27FC236}">
+                <a16:creationId xmlns:a16="http://schemas.microsoft.com/office/drawing/2014/main" id="{E4C63B04-E4B8-4A0F-977B-0C3536AED3FC}"/>
+              </a:ext>
+            </a:extLst>
+          </p:cNvPr>
+          <p:cNvSpPr/>
+          <p:nvPr/>
+        </p:nvSpPr>
+        <p:spPr>
+          <a:xfrm>
+            <a:off x="7939403" y="3821334"/>
+            <a:ext cx="677662" cy="550415"/>
+          </a:xfrm>
+          <a:prstGeom prst="ellipse">
+            <a:avLst/>
+          </a:prstGeom>
+        </p:spPr>
+        <p:style>
+          <a:lnRef idx="2">
+            <a:schemeClr val="accent3">
+              <a:shade val="50000"/>
+            </a:schemeClr>
+          </a:lnRef>
+          <a:fillRef idx="1">
+            <a:schemeClr val="accent3"/>
+          </a:fillRef>
+          <a:effectRef idx="0">
+            <a:schemeClr val="accent3"/>
+          </a:effectRef>
+          <a:fontRef idx="minor">
+            <a:schemeClr val="lt1"/>
+          </a:fontRef>
+        </p:style>
+        <p:txBody>
+          <a:bodyPr rtlCol="0" anchor="ctr"/>
+          <a:lstStyle/>
+          <a:p>
+            <a:pPr algn="ctr"/>
+            <a:r>
+              <a:rPr lang="en-US" dirty="0"/>
+              <a:t>“s”</a:t>
+            </a:r>
+          </a:p>
+        </p:txBody>
+      </p:sp>
+      <p:sp>
+        <p:nvSpPr>
+          <p:cNvPr id="16" name="Oval 15">
+            <a:extLst>
+              <a:ext uri="{FF2B5EF4-FFF2-40B4-BE49-F238E27FC236}">
+                <a16:creationId xmlns:a16="http://schemas.microsoft.com/office/drawing/2014/main" id="{0EE390BD-0B37-431B-8C3D-333997922EF8}"/>
+              </a:ext>
+            </a:extLst>
+          </p:cNvPr>
+          <p:cNvSpPr/>
+          <p:nvPr/>
+        </p:nvSpPr>
+        <p:spPr>
+          <a:xfrm>
+            <a:off x="8185019" y="4474763"/>
+            <a:ext cx="677662" cy="550415"/>
+          </a:xfrm>
+          <a:prstGeom prst="ellipse">
+            <a:avLst/>
+          </a:prstGeom>
+        </p:spPr>
+        <p:style>
+          <a:lnRef idx="2">
+            <a:schemeClr val="accent3">
+              <a:shade val="50000"/>
+            </a:schemeClr>
+          </a:lnRef>
+          <a:fillRef idx="1">
+            <a:schemeClr val="accent3"/>
+          </a:fillRef>
+          <a:effectRef idx="0">
+            <a:schemeClr val="accent3"/>
+          </a:effectRef>
+          <a:fontRef idx="minor">
+            <a:schemeClr val="lt1"/>
+          </a:fontRef>
+        </p:style>
+        <p:txBody>
+          <a:bodyPr rtlCol="0" anchor="ctr"/>
+          <a:lstStyle/>
+          <a:p>
+            <a:pPr algn="ctr"/>
+            <a:r>
+              <a:rPr lang="en-US" dirty="0"/>
+              <a:t>“s”</a:t>
+            </a:r>
+          </a:p>
+        </p:txBody>
+      </p:sp>
+      <p:sp>
+        <p:nvSpPr>
+          <p:cNvPr id="18" name="Arrow: Right 17">
+            <a:extLst>
+              <a:ext uri="{FF2B5EF4-FFF2-40B4-BE49-F238E27FC236}">
+                <a16:creationId xmlns:a16="http://schemas.microsoft.com/office/drawing/2014/main" id="{7A7E1ADD-9869-47DD-AC81-D07B6A9C14CC}"/>
+              </a:ext>
+            </a:extLst>
+          </p:cNvPr>
+          <p:cNvSpPr/>
+          <p:nvPr/>
+        </p:nvSpPr>
+        <p:spPr>
+          <a:xfrm rot="2827417">
+            <a:off x="4907441" y="3556156"/>
+            <a:ext cx="3972234" cy="349538"/>
+          </a:xfrm>
+          <a:prstGeom prst="rightArrow">
+            <a:avLst/>
+          </a:prstGeom>
+        </p:spPr>
+        <p:style>
+          <a:lnRef idx="2">
+            <a:schemeClr val="accent6">
+              <a:shade val="50000"/>
+            </a:schemeClr>
+          </a:lnRef>
+          <a:fillRef idx="1">
+            <a:schemeClr val="accent6"/>
+          </a:fillRef>
+          <a:effectRef idx="0">
+            <a:schemeClr val="accent6"/>
+          </a:effectRef>
+          <a:fontRef idx="minor">
+            <a:schemeClr val="lt1"/>
+          </a:fontRef>
+        </p:style>
+        <p:txBody>
+          <a:bodyPr rtlCol="0" anchor="ctr"/>
+          <a:lstStyle/>
+          <a:p>
+            <a:pPr algn="ctr"/>
+            <a:endParaRPr lang="en-US"/>
+          </a:p>
+        </p:txBody>
+      </p:sp>
+      <p:sp>
+        <p:nvSpPr>
+          <p:cNvPr id="25" name="Oval 24">
+            <a:extLst>
+              <a:ext uri="{FF2B5EF4-FFF2-40B4-BE49-F238E27FC236}">
+                <a16:creationId xmlns:a16="http://schemas.microsoft.com/office/drawing/2014/main" id="{C3F8F147-6BB6-40B9-BE5E-69EA2614CB68}"/>
+              </a:ext>
+            </a:extLst>
+          </p:cNvPr>
+          <p:cNvSpPr/>
+          <p:nvPr/>
+        </p:nvSpPr>
+        <p:spPr>
+          <a:xfrm>
+            <a:off x="7939403" y="5155042"/>
+            <a:ext cx="677662" cy="550415"/>
+          </a:xfrm>
+          <a:prstGeom prst="ellipse">
+            <a:avLst/>
+          </a:prstGeom>
+        </p:spPr>
+        <p:style>
+          <a:lnRef idx="2">
+            <a:schemeClr val="accent3">
+              <a:shade val="50000"/>
+            </a:schemeClr>
+          </a:lnRef>
+          <a:fillRef idx="1">
+            <a:schemeClr val="accent3"/>
+          </a:fillRef>
+          <a:effectRef idx="0">
+            <a:schemeClr val="accent3"/>
+          </a:effectRef>
+          <a:fontRef idx="minor">
+            <a:schemeClr val="lt1"/>
+          </a:fontRef>
+        </p:style>
+        <p:txBody>
+          <a:bodyPr rtlCol="0" anchor="ctr"/>
+          <a:lstStyle/>
+          <a:p>
+            <a:pPr algn="ctr"/>
+            <a:r>
+              <a:rPr lang="en-US" dirty="0"/>
+              <a:t>“s”</a:t>
+            </a:r>
+          </a:p>
+        </p:txBody>
+      </p:sp>
+      <p:sp>
+        <p:nvSpPr>
+          <p:cNvPr id="28" name="TextBox 27">
+            <a:extLst>
+              <a:ext uri="{FF2B5EF4-FFF2-40B4-BE49-F238E27FC236}">
+                <a16:creationId xmlns:a16="http://schemas.microsoft.com/office/drawing/2014/main" id="{7C668A2E-7D14-477A-BB0A-FEC6FC68E80C}"/>
+              </a:ext>
+            </a:extLst>
+          </p:cNvPr>
+          <p:cNvSpPr txBox="1"/>
+          <p:nvPr/>
+        </p:nvSpPr>
+        <p:spPr>
+          <a:xfrm>
+            <a:off x="9534617" y="365125"/>
+            <a:ext cx="2308195" cy="369332"/>
+          </a:xfrm>
+          <a:prstGeom prst="rect">
+            <a:avLst/>
+          </a:prstGeom>
+          <a:noFill/>
+        </p:spPr>
+        <p:txBody>
+          <a:bodyPr wrap="square" rtlCol="0">
+            <a:spAutoFit/>
+          </a:bodyPr>
+          <a:lstStyle/>
+          <a:p>
+            <a:r>
+              <a:rPr lang="en-US" dirty="0" err="1"/>
+              <a:t>System.gc</a:t>
+            </a:r>
+            <a:r>
+              <a:rPr lang="en-US" dirty="0"/>
+              <a:t>();</a:t>
+            </a:r>
+          </a:p>
+        </p:txBody>
+      </p:sp>
+    </p:spTree>
+    <p:extLst>
+      <p:ext uri="{BB962C8B-B14F-4D97-AF65-F5344CB8AC3E}">
+        <p14:creationId xmlns:p14="http://schemas.microsoft.com/office/powerpoint/2010/main" val="3722330026"/>
+      </p:ext>
+    </p:extLst>
+  </p:cSld>
+  <p:clrMapOvr>
+    <a:masterClrMapping/>
+  </p:clrMapOvr>
+</p:sld>
+</file>
+
+<file path=ppt/slides/slide6.xml><?xml version="1.0" encoding="utf-8"?>
+<p:sld xmlns:a="http://schemas.openxmlformats.org/drawingml/2006/main" xmlns:r="http://schemas.openxmlformats.org/officeDocument/2006/relationships" xmlns:p="http://schemas.openxmlformats.org/presentationml/2006/main">
+  <p:cSld>
+    <p:spTree>
+      <p:nvGrpSpPr>
+        <p:cNvPr id="1" name=""/>
+        <p:cNvGrpSpPr/>
+        <p:nvPr/>
+      </p:nvGrpSpPr>
+      <p:grpSpPr>
+        <a:xfrm>
+          <a:off x="0" y="0"/>
+          <a:ext cx="0" cy="0"/>
+          <a:chOff x="0" y="0"/>
+          <a:chExt cx="0" cy="0"/>
+        </a:xfrm>
+      </p:grpSpPr>
+      <p:sp>
+        <p:nvSpPr>
+          <p:cNvPr id="2" name="Title 1">
+            <a:extLst>
+              <a:ext uri="{FF2B5EF4-FFF2-40B4-BE49-F238E27FC236}">
                 <a16:creationId xmlns:a16="http://schemas.microsoft.com/office/drawing/2014/main" id="{66DF7FFD-2090-4299-A25A-F796B3774FC8}"/>
               </a:ext>
             </a:extLst>
@@ -4223,6 +5746,201 @@
     <p:extLst>
       <p:ext uri="{BB962C8B-B14F-4D97-AF65-F5344CB8AC3E}">
         <p14:creationId xmlns:p14="http://schemas.microsoft.com/office/powerpoint/2010/main" val="4212173047"/>
+      </p:ext>
+    </p:extLst>
+  </p:cSld>
+  <p:clrMapOvr>
+    <a:masterClrMapping/>
+  </p:clrMapOvr>
+</p:sld>
+</file>
+
+<file path=ppt/slides/slide7.xml><?xml version="1.0" encoding="utf-8"?>
+<p:sld xmlns:a="http://schemas.openxmlformats.org/drawingml/2006/main" xmlns:r="http://schemas.openxmlformats.org/officeDocument/2006/relationships" xmlns:p="http://schemas.openxmlformats.org/presentationml/2006/main">
+  <p:cSld>
+    <p:spTree>
+      <p:nvGrpSpPr>
+        <p:cNvPr id="1" name=""/>
+        <p:cNvGrpSpPr/>
+        <p:nvPr/>
+      </p:nvGrpSpPr>
+      <p:grpSpPr>
+        <a:xfrm>
+          <a:off x="0" y="0"/>
+          <a:ext cx="0" cy="0"/>
+          <a:chOff x="0" y="0"/>
+          <a:chExt cx="0" cy="0"/>
+        </a:xfrm>
+      </p:grpSpPr>
+      <p:sp>
+        <p:nvSpPr>
+          <p:cNvPr id="2" name="Title 1">
+            <a:extLst>
+              <a:ext uri="{FF2B5EF4-FFF2-40B4-BE49-F238E27FC236}">
+                <a16:creationId xmlns:a16="http://schemas.microsoft.com/office/drawing/2014/main" id="{064C6609-48F8-4784-8B80-4835BC6F8B46}"/>
+              </a:ext>
+            </a:extLst>
+          </p:cNvPr>
+          <p:cNvSpPr>
+            <a:spLocks noGrp="1"/>
+          </p:cNvSpPr>
+          <p:nvPr>
+            <p:ph type="title"/>
+          </p:nvPr>
+        </p:nvSpPr>
+        <p:spPr/>
+        <p:txBody>
+          <a:bodyPr/>
+          <a:lstStyle/>
+          <a:p>
+            <a:endParaRPr lang="en-US" dirty="0"/>
+          </a:p>
+        </p:txBody>
+      </p:sp>
+      <p:sp>
+        <p:nvSpPr>
+          <p:cNvPr id="4" name="Oval 3">
+            <a:extLst>
+              <a:ext uri="{FF2B5EF4-FFF2-40B4-BE49-F238E27FC236}">
+                <a16:creationId xmlns:a16="http://schemas.microsoft.com/office/drawing/2014/main" id="{BA9D7F9A-2F5D-40E3-B3B8-61B2BA764C6B}"/>
+              </a:ext>
+            </a:extLst>
+          </p:cNvPr>
+          <p:cNvSpPr/>
+          <p:nvPr/>
+        </p:nvSpPr>
+        <p:spPr>
+          <a:xfrm>
+            <a:off x="3841072" y="1981317"/>
+            <a:ext cx="2254928" cy="1713390"/>
+          </a:xfrm>
+          <a:prstGeom prst="ellipse">
+            <a:avLst/>
+          </a:prstGeom>
+        </p:spPr>
+        <p:style>
+          <a:lnRef idx="2">
+            <a:schemeClr val="accent4">
+              <a:shade val="50000"/>
+            </a:schemeClr>
+          </a:lnRef>
+          <a:fillRef idx="1">
+            <a:schemeClr val="accent4"/>
+          </a:fillRef>
+          <a:effectRef idx="0">
+            <a:schemeClr val="accent4"/>
+          </a:effectRef>
+          <a:fontRef idx="minor">
+            <a:schemeClr val="lt1"/>
+          </a:fontRef>
+        </p:style>
+        <p:txBody>
+          <a:bodyPr rtlCol="0" anchor="ctr"/>
+          <a:lstStyle/>
+          <a:p>
+            <a:pPr algn="ctr"/>
+            <a:r>
+              <a:rPr lang="en-US" dirty="0"/>
+              <a:t>Server</a:t>
+            </a:r>
+          </a:p>
+        </p:txBody>
+      </p:sp>
+      <p:cxnSp>
+        <p:nvCxnSpPr>
+          <p:cNvPr id="6" name="Straight Arrow Connector 5">
+            <a:extLst>
+              <a:ext uri="{FF2B5EF4-FFF2-40B4-BE49-F238E27FC236}">
+                <a16:creationId xmlns:a16="http://schemas.microsoft.com/office/drawing/2014/main" id="{1E57F936-6496-4DF3-8D56-22F0A95F95FD}"/>
+              </a:ext>
+            </a:extLst>
+          </p:cNvPr>
+          <p:cNvCxnSpPr>
+            <a:cxnSpLocks/>
+            <a:stCxn id="4" idx="6"/>
+          </p:cNvCxnSpPr>
+          <p:nvPr/>
+        </p:nvCxnSpPr>
+        <p:spPr>
+          <a:xfrm>
+            <a:off x="6096000" y="2838012"/>
+            <a:ext cx="1613514" cy="1056940"/>
+          </a:xfrm>
+          <a:prstGeom prst="straightConnector1">
+            <a:avLst/>
+          </a:prstGeom>
+          <a:ln>
+            <a:tailEnd type="triangle"/>
+          </a:ln>
+        </p:spPr>
+        <p:style>
+          <a:lnRef idx="1">
+            <a:schemeClr val="accent1"/>
+          </a:lnRef>
+          <a:fillRef idx="0">
+            <a:schemeClr val="accent1"/>
+          </a:fillRef>
+          <a:effectRef idx="0">
+            <a:schemeClr val="accent1"/>
+          </a:effectRef>
+          <a:fontRef idx="minor">
+            <a:schemeClr val="tx1"/>
+          </a:fontRef>
+        </p:style>
+      </p:cxnSp>
+      <p:sp>
+        <p:nvSpPr>
+          <p:cNvPr id="7" name="Rectangle 6">
+            <a:extLst>
+              <a:ext uri="{FF2B5EF4-FFF2-40B4-BE49-F238E27FC236}">
+                <a16:creationId xmlns:a16="http://schemas.microsoft.com/office/drawing/2014/main" id="{50E5D635-3270-49D6-AB08-3D2CFB52752F}"/>
+              </a:ext>
+            </a:extLst>
+          </p:cNvPr>
+          <p:cNvSpPr/>
+          <p:nvPr/>
+        </p:nvSpPr>
+        <p:spPr>
+          <a:xfrm>
+            <a:off x="6902757" y="3968319"/>
+            <a:ext cx="2379216" cy="2015231"/>
+          </a:xfrm>
+          <a:prstGeom prst="rect">
+            <a:avLst/>
+          </a:prstGeom>
+        </p:spPr>
+        <p:style>
+          <a:lnRef idx="2">
+            <a:schemeClr val="accent1">
+              <a:shade val="50000"/>
+            </a:schemeClr>
+          </a:lnRef>
+          <a:fillRef idx="1">
+            <a:schemeClr val="accent1"/>
+          </a:fillRef>
+          <a:effectRef idx="0">
+            <a:schemeClr val="accent1"/>
+          </a:effectRef>
+          <a:fontRef idx="minor">
+            <a:schemeClr val="lt1"/>
+          </a:fontRef>
+        </p:style>
+        <p:txBody>
+          <a:bodyPr rtlCol="0" anchor="ctr"/>
+          <a:lstStyle/>
+          <a:p>
+            <a:pPr algn="ctr"/>
+            <a:r>
+              <a:rPr lang="en-US" dirty="0"/>
+              <a:t>Pirates.txt</a:t>
+            </a:r>
+          </a:p>
+        </p:txBody>
+      </p:sp>
+    </p:spTree>
+    <p:extLst>
+      <p:ext uri="{BB962C8B-B14F-4D97-AF65-F5344CB8AC3E}">
+        <p14:creationId xmlns:p14="http://schemas.microsoft.com/office/powerpoint/2010/main" val="3870656344"/>
       </p:ext>
     </p:extLst>
   </p:cSld>

</xml_diff>

<commit_message>
updated ppt/ added pdf
</commit_message>
<xml_diff>
--- a/Week1/Week1Java.pptx
+++ b/Week1/Week1Java.pptx
@@ -10,8 +10,9 @@
     <p:sldId id="258" r:id="rId4"/>
     <p:sldId id="261" r:id="rId5"/>
     <p:sldId id="262" r:id="rId6"/>
-    <p:sldId id="259" r:id="rId7"/>
-    <p:sldId id="260" r:id="rId8"/>
+    <p:sldId id="263" r:id="rId7"/>
+    <p:sldId id="259" r:id="rId8"/>
+    <p:sldId id="260" r:id="rId9"/>
   </p:sldIdLst>
   <p:sldSz cx="12192000" cy="6858000"/>
   <p:notesSz cx="6858000" cy="9144000"/>
@@ -265,7 +266,7 @@
           <a:p>
             <a:fld id="{86108D1E-0F48-4D71-8A61-3A4FB1009D51}" type="datetimeFigureOut">
               <a:rPr lang="en-US" smtClean="0"/>
-              <a:t>11/11/2020</a:t>
+              <a:t>11/13/2020</a:t>
             </a:fld>
             <a:endParaRPr lang="en-US"/>
           </a:p>
@@ -463,7 +464,7 @@
           <a:p>
             <a:fld id="{86108D1E-0F48-4D71-8A61-3A4FB1009D51}" type="datetimeFigureOut">
               <a:rPr lang="en-US" smtClean="0"/>
-              <a:t>11/11/2020</a:t>
+              <a:t>11/13/2020</a:t>
             </a:fld>
             <a:endParaRPr lang="en-US"/>
           </a:p>
@@ -671,7 +672,7 @@
           <a:p>
             <a:fld id="{86108D1E-0F48-4D71-8A61-3A4FB1009D51}" type="datetimeFigureOut">
               <a:rPr lang="en-US" smtClean="0"/>
-              <a:t>11/11/2020</a:t>
+              <a:t>11/13/2020</a:t>
             </a:fld>
             <a:endParaRPr lang="en-US"/>
           </a:p>
@@ -869,7 +870,7 @@
           <a:p>
             <a:fld id="{86108D1E-0F48-4D71-8A61-3A4FB1009D51}" type="datetimeFigureOut">
               <a:rPr lang="en-US" smtClean="0"/>
-              <a:t>11/11/2020</a:t>
+              <a:t>11/13/2020</a:t>
             </a:fld>
             <a:endParaRPr lang="en-US"/>
           </a:p>
@@ -1144,7 +1145,7 @@
           <a:p>
             <a:fld id="{86108D1E-0F48-4D71-8A61-3A4FB1009D51}" type="datetimeFigureOut">
               <a:rPr lang="en-US" smtClean="0"/>
-              <a:t>11/11/2020</a:t>
+              <a:t>11/13/2020</a:t>
             </a:fld>
             <a:endParaRPr lang="en-US"/>
           </a:p>
@@ -1409,7 +1410,7 @@
           <a:p>
             <a:fld id="{86108D1E-0F48-4D71-8A61-3A4FB1009D51}" type="datetimeFigureOut">
               <a:rPr lang="en-US" smtClean="0"/>
-              <a:t>11/11/2020</a:t>
+              <a:t>11/13/2020</a:t>
             </a:fld>
             <a:endParaRPr lang="en-US"/>
           </a:p>
@@ -1821,7 +1822,7 @@
           <a:p>
             <a:fld id="{86108D1E-0F48-4D71-8A61-3A4FB1009D51}" type="datetimeFigureOut">
               <a:rPr lang="en-US" smtClean="0"/>
-              <a:t>11/11/2020</a:t>
+              <a:t>11/13/2020</a:t>
             </a:fld>
             <a:endParaRPr lang="en-US"/>
           </a:p>
@@ -1962,7 +1963,7 @@
           <a:p>
             <a:fld id="{86108D1E-0F48-4D71-8A61-3A4FB1009D51}" type="datetimeFigureOut">
               <a:rPr lang="en-US" smtClean="0"/>
-              <a:t>11/11/2020</a:t>
+              <a:t>11/13/2020</a:t>
             </a:fld>
             <a:endParaRPr lang="en-US"/>
           </a:p>
@@ -2075,7 +2076,7 @@
           <a:p>
             <a:fld id="{86108D1E-0F48-4D71-8A61-3A4FB1009D51}" type="datetimeFigureOut">
               <a:rPr lang="en-US" smtClean="0"/>
-              <a:t>11/11/2020</a:t>
+              <a:t>11/13/2020</a:t>
             </a:fld>
             <a:endParaRPr lang="en-US"/>
           </a:p>
@@ -2386,7 +2387,7 @@
           <a:p>
             <a:fld id="{86108D1E-0F48-4D71-8A61-3A4FB1009D51}" type="datetimeFigureOut">
               <a:rPr lang="en-US" smtClean="0"/>
-              <a:t>11/11/2020</a:t>
+              <a:t>11/13/2020</a:t>
             </a:fld>
             <a:endParaRPr lang="en-US"/>
           </a:p>
@@ -2674,7 +2675,7 @@
           <a:p>
             <a:fld id="{86108D1E-0F48-4D71-8A61-3A4FB1009D51}" type="datetimeFigureOut">
               <a:rPr lang="en-US" smtClean="0"/>
-              <a:t>11/11/2020</a:t>
+              <a:t>11/13/2020</a:t>
             </a:fld>
             <a:endParaRPr lang="en-US"/>
           </a:p>
@@ -2915,7 +2916,7 @@
           <a:p>
             <a:fld id="{86108D1E-0F48-4D71-8A61-3A4FB1009D51}" type="datetimeFigureOut">
               <a:rPr lang="en-US" smtClean="0"/>
-              <a:t>11/11/2020</a:t>
+              <a:t>11/13/2020</a:t>
             </a:fld>
             <a:endParaRPr lang="en-US"/>
           </a:p>
@@ -5664,6 +5665,946 @@
           <p:cNvPr id="2" name="Title 1">
             <a:extLst>
               <a:ext uri="{FF2B5EF4-FFF2-40B4-BE49-F238E27FC236}">
+                <a16:creationId xmlns:a16="http://schemas.microsoft.com/office/drawing/2014/main" id="{31A954B4-1309-4236-846F-E41FA8E87326}"/>
+              </a:ext>
+            </a:extLst>
+          </p:cNvPr>
+          <p:cNvSpPr>
+            <a:spLocks noGrp="1"/>
+          </p:cNvSpPr>
+          <p:nvPr>
+            <p:ph type="title"/>
+          </p:nvPr>
+        </p:nvSpPr>
+        <p:spPr/>
+        <p:txBody>
+          <a:bodyPr/>
+          <a:lstStyle/>
+          <a:p>
+            <a:r>
+              <a:rPr lang="en-US" dirty="0"/>
+              <a:t>Multithreading</a:t>
+            </a:r>
+          </a:p>
+        </p:txBody>
+      </p:sp>
+      <p:sp>
+        <p:nvSpPr>
+          <p:cNvPr id="4" name="Cloud 3">
+            <a:extLst>
+              <a:ext uri="{FF2B5EF4-FFF2-40B4-BE49-F238E27FC236}">
+                <a16:creationId xmlns:a16="http://schemas.microsoft.com/office/drawing/2014/main" id="{D02A3AF5-01BB-450F-AC82-90DC06733970}"/>
+              </a:ext>
+            </a:extLst>
+          </p:cNvPr>
+          <p:cNvSpPr/>
+          <p:nvPr/>
+        </p:nvSpPr>
+        <p:spPr>
+          <a:xfrm>
+            <a:off x="7196831" y="3248087"/>
+            <a:ext cx="4509857" cy="3244788"/>
+          </a:xfrm>
+          <a:prstGeom prst="cloud">
+            <a:avLst/>
+          </a:prstGeom>
+        </p:spPr>
+        <p:style>
+          <a:lnRef idx="2">
+            <a:schemeClr val="accent1">
+              <a:shade val="50000"/>
+            </a:schemeClr>
+          </a:lnRef>
+          <a:fillRef idx="1">
+            <a:schemeClr val="accent1"/>
+          </a:fillRef>
+          <a:effectRef idx="0">
+            <a:schemeClr val="accent1"/>
+          </a:effectRef>
+          <a:fontRef idx="minor">
+            <a:schemeClr val="lt1"/>
+          </a:fontRef>
+        </p:style>
+        <p:txBody>
+          <a:bodyPr rtlCol="0" anchor="ctr"/>
+          <a:lstStyle/>
+          <a:p>
+            <a:pPr algn="ctr"/>
+            <a:r>
+              <a:rPr lang="en-US" dirty="0"/>
+              <a:t>Heap</a:t>
+            </a:r>
+          </a:p>
+        </p:txBody>
+      </p:sp>
+      <p:sp>
+        <p:nvSpPr>
+          <p:cNvPr id="5" name="Cylinder 4">
+            <a:extLst>
+              <a:ext uri="{FF2B5EF4-FFF2-40B4-BE49-F238E27FC236}">
+                <a16:creationId xmlns:a16="http://schemas.microsoft.com/office/drawing/2014/main" id="{3E68A659-24A5-424B-94B2-0CB5ED467D47}"/>
+              </a:ext>
+            </a:extLst>
+          </p:cNvPr>
+          <p:cNvSpPr/>
+          <p:nvPr/>
+        </p:nvSpPr>
+        <p:spPr>
+          <a:xfrm>
+            <a:off x="2127682" y="2938509"/>
+            <a:ext cx="2849732" cy="3755254"/>
+          </a:xfrm>
+          <a:prstGeom prst="can">
+            <a:avLst/>
+          </a:prstGeom>
+        </p:spPr>
+        <p:style>
+          <a:lnRef idx="2">
+            <a:schemeClr val="accent1">
+              <a:shade val="50000"/>
+            </a:schemeClr>
+          </a:lnRef>
+          <a:fillRef idx="1">
+            <a:schemeClr val="accent1"/>
+          </a:fillRef>
+          <a:effectRef idx="0">
+            <a:schemeClr val="accent1"/>
+          </a:effectRef>
+          <a:fontRef idx="minor">
+            <a:schemeClr val="lt1"/>
+          </a:fontRef>
+        </p:style>
+        <p:txBody>
+          <a:bodyPr rtlCol="0" anchor="ctr"/>
+          <a:lstStyle/>
+          <a:p>
+            <a:pPr algn="ctr"/>
+            <a:r>
+              <a:rPr lang="en-US" dirty="0"/>
+              <a:t>Stack</a:t>
+            </a:r>
+          </a:p>
+        </p:txBody>
+      </p:sp>
+      <p:sp>
+        <p:nvSpPr>
+          <p:cNvPr id="11" name="Rectangle: Rounded Corners 10">
+            <a:extLst>
+              <a:ext uri="{FF2B5EF4-FFF2-40B4-BE49-F238E27FC236}">
+                <a16:creationId xmlns:a16="http://schemas.microsoft.com/office/drawing/2014/main" id="{C0B62521-3041-4994-8048-15CD5868979C}"/>
+              </a:ext>
+            </a:extLst>
+          </p:cNvPr>
+          <p:cNvSpPr/>
+          <p:nvPr/>
+        </p:nvSpPr>
+        <p:spPr>
+          <a:xfrm>
+            <a:off x="2642586" y="6242535"/>
+            <a:ext cx="1819923" cy="250340"/>
+          </a:xfrm>
+          <a:prstGeom prst="roundRect">
+            <a:avLst/>
+          </a:prstGeom>
+        </p:spPr>
+        <p:style>
+          <a:lnRef idx="2">
+            <a:schemeClr val="accent4">
+              <a:shade val="50000"/>
+            </a:schemeClr>
+          </a:lnRef>
+          <a:fillRef idx="1">
+            <a:schemeClr val="accent4"/>
+          </a:fillRef>
+          <a:effectRef idx="0">
+            <a:schemeClr val="accent4"/>
+          </a:effectRef>
+          <a:fontRef idx="minor">
+            <a:schemeClr val="lt1"/>
+          </a:fontRef>
+        </p:style>
+        <p:txBody>
+          <a:bodyPr rtlCol="0" anchor="ctr"/>
+          <a:lstStyle/>
+          <a:p>
+            <a:pPr algn="ctr"/>
+            <a:r>
+              <a:rPr lang="en-US" dirty="0"/>
+              <a:t>Main method</a:t>
+            </a:r>
+          </a:p>
+        </p:txBody>
+      </p:sp>
+      <p:sp>
+        <p:nvSpPr>
+          <p:cNvPr id="13" name="Rectangle: Rounded Corners 12">
+            <a:extLst>
+              <a:ext uri="{FF2B5EF4-FFF2-40B4-BE49-F238E27FC236}">
+                <a16:creationId xmlns:a16="http://schemas.microsoft.com/office/drawing/2014/main" id="{FEE8A817-79B6-48AE-8C9B-279A70C2D4D7}"/>
+              </a:ext>
+            </a:extLst>
+          </p:cNvPr>
+          <p:cNvSpPr/>
+          <p:nvPr/>
+        </p:nvSpPr>
+        <p:spPr>
+          <a:xfrm>
+            <a:off x="2642586" y="6006648"/>
+            <a:ext cx="1819923" cy="250340"/>
+          </a:xfrm>
+          <a:prstGeom prst="roundRect">
+            <a:avLst/>
+          </a:prstGeom>
+        </p:spPr>
+        <p:style>
+          <a:lnRef idx="2">
+            <a:schemeClr val="accent4">
+              <a:shade val="50000"/>
+            </a:schemeClr>
+          </a:lnRef>
+          <a:fillRef idx="1">
+            <a:schemeClr val="accent4"/>
+          </a:fillRef>
+          <a:effectRef idx="0">
+            <a:schemeClr val="accent4"/>
+          </a:effectRef>
+          <a:fontRef idx="minor">
+            <a:schemeClr val="lt1"/>
+          </a:fontRef>
+        </p:style>
+        <p:txBody>
+          <a:bodyPr rtlCol="0" anchor="ctr"/>
+          <a:lstStyle/>
+          <a:p>
+            <a:pPr algn="ctr"/>
+            <a:r>
+              <a:rPr lang="en-US" dirty="0"/>
+              <a:t>A()</a:t>
+            </a:r>
+          </a:p>
+        </p:txBody>
+      </p:sp>
+      <p:sp>
+        <p:nvSpPr>
+          <p:cNvPr id="15" name="Rectangle: Rounded Corners 14">
+            <a:extLst>
+              <a:ext uri="{FF2B5EF4-FFF2-40B4-BE49-F238E27FC236}">
+                <a16:creationId xmlns:a16="http://schemas.microsoft.com/office/drawing/2014/main" id="{D2D1EF55-E1E8-4C7C-97F6-D1023731A886}"/>
+              </a:ext>
+            </a:extLst>
+          </p:cNvPr>
+          <p:cNvSpPr/>
+          <p:nvPr/>
+        </p:nvSpPr>
+        <p:spPr>
+          <a:xfrm>
+            <a:off x="2642586" y="5769878"/>
+            <a:ext cx="1819923" cy="250340"/>
+          </a:xfrm>
+          <a:prstGeom prst="roundRect">
+            <a:avLst/>
+          </a:prstGeom>
+        </p:spPr>
+        <p:style>
+          <a:lnRef idx="2">
+            <a:schemeClr val="accent4">
+              <a:shade val="50000"/>
+            </a:schemeClr>
+          </a:lnRef>
+          <a:fillRef idx="1">
+            <a:schemeClr val="accent4"/>
+          </a:fillRef>
+          <a:effectRef idx="0">
+            <a:schemeClr val="accent4"/>
+          </a:effectRef>
+          <a:fontRef idx="minor">
+            <a:schemeClr val="lt1"/>
+          </a:fontRef>
+        </p:style>
+        <p:txBody>
+          <a:bodyPr rtlCol="0" anchor="ctr"/>
+          <a:lstStyle/>
+          <a:p>
+            <a:pPr algn="ctr"/>
+            <a:r>
+              <a:rPr lang="en-US" dirty="0"/>
+              <a:t>A’s reference var</a:t>
+            </a:r>
+          </a:p>
+        </p:txBody>
+      </p:sp>
+      <p:sp>
+        <p:nvSpPr>
+          <p:cNvPr id="17" name="Rectangle: Rounded Corners 16">
+            <a:extLst>
+              <a:ext uri="{FF2B5EF4-FFF2-40B4-BE49-F238E27FC236}">
+                <a16:creationId xmlns:a16="http://schemas.microsoft.com/office/drawing/2014/main" id="{8BD0D36E-2E65-4323-B119-7A5FF510B14E}"/>
+              </a:ext>
+            </a:extLst>
+          </p:cNvPr>
+          <p:cNvSpPr/>
+          <p:nvPr/>
+        </p:nvSpPr>
+        <p:spPr>
+          <a:xfrm>
+            <a:off x="2642586" y="5555420"/>
+            <a:ext cx="1819923" cy="250340"/>
+          </a:xfrm>
+          <a:prstGeom prst="roundRect">
+            <a:avLst/>
+          </a:prstGeom>
+        </p:spPr>
+        <p:style>
+          <a:lnRef idx="2">
+            <a:schemeClr val="accent4">
+              <a:shade val="50000"/>
+            </a:schemeClr>
+          </a:lnRef>
+          <a:fillRef idx="1">
+            <a:schemeClr val="accent4"/>
+          </a:fillRef>
+          <a:effectRef idx="0">
+            <a:schemeClr val="accent4"/>
+          </a:effectRef>
+          <a:fontRef idx="minor">
+            <a:schemeClr val="lt1"/>
+          </a:fontRef>
+        </p:style>
+        <p:txBody>
+          <a:bodyPr rtlCol="0" anchor="ctr"/>
+          <a:lstStyle/>
+          <a:p>
+            <a:pPr algn="ctr"/>
+            <a:r>
+              <a:rPr lang="en-US" dirty="0"/>
+              <a:t>B()</a:t>
+            </a:r>
+          </a:p>
+        </p:txBody>
+      </p:sp>
+      <p:sp>
+        <p:nvSpPr>
+          <p:cNvPr id="19" name="Rectangle: Rounded Corners 18">
+            <a:extLst>
+              <a:ext uri="{FF2B5EF4-FFF2-40B4-BE49-F238E27FC236}">
+                <a16:creationId xmlns:a16="http://schemas.microsoft.com/office/drawing/2014/main" id="{56F43A2F-2621-4D7B-B86B-B70B9CDBD3EF}"/>
+              </a:ext>
+            </a:extLst>
+          </p:cNvPr>
+          <p:cNvSpPr/>
+          <p:nvPr/>
+        </p:nvSpPr>
+        <p:spPr>
+          <a:xfrm>
+            <a:off x="2642585" y="5305080"/>
+            <a:ext cx="1819923" cy="250340"/>
+          </a:xfrm>
+          <a:prstGeom prst="roundRect">
+            <a:avLst/>
+          </a:prstGeom>
+        </p:spPr>
+        <p:style>
+          <a:lnRef idx="2">
+            <a:schemeClr val="accent4">
+              <a:shade val="50000"/>
+            </a:schemeClr>
+          </a:lnRef>
+          <a:fillRef idx="1">
+            <a:schemeClr val="accent4"/>
+          </a:fillRef>
+          <a:effectRef idx="0">
+            <a:schemeClr val="accent4"/>
+          </a:effectRef>
+          <a:fontRef idx="minor">
+            <a:schemeClr val="lt1"/>
+          </a:fontRef>
+        </p:style>
+        <p:txBody>
+          <a:bodyPr rtlCol="0" anchor="ctr"/>
+          <a:lstStyle/>
+          <a:p>
+            <a:pPr algn="ctr"/>
+            <a:r>
+              <a:rPr lang="en-US" dirty="0"/>
+              <a:t>B’s reference var</a:t>
+            </a:r>
+          </a:p>
+        </p:txBody>
+      </p:sp>
+      <p:sp>
+        <p:nvSpPr>
+          <p:cNvPr id="3" name="Cloud 2">
+            <a:extLst>
+              <a:ext uri="{FF2B5EF4-FFF2-40B4-BE49-F238E27FC236}">
+                <a16:creationId xmlns:a16="http://schemas.microsoft.com/office/drawing/2014/main" id="{01AC3C2B-73AA-482D-98B6-0CC1A6150E4A}"/>
+              </a:ext>
+            </a:extLst>
+          </p:cNvPr>
+          <p:cNvSpPr/>
+          <p:nvPr/>
+        </p:nvSpPr>
+        <p:spPr>
+          <a:xfrm>
+            <a:off x="9747681" y="4125233"/>
+            <a:ext cx="1740023" cy="1305017"/>
+          </a:xfrm>
+          <a:prstGeom prst="cloud">
+            <a:avLst/>
+          </a:prstGeom>
+        </p:spPr>
+        <p:style>
+          <a:lnRef idx="2">
+            <a:schemeClr val="accent5">
+              <a:shade val="50000"/>
+            </a:schemeClr>
+          </a:lnRef>
+          <a:fillRef idx="1">
+            <a:schemeClr val="accent5"/>
+          </a:fillRef>
+          <a:effectRef idx="0">
+            <a:schemeClr val="accent5"/>
+          </a:effectRef>
+          <a:fontRef idx="minor">
+            <a:schemeClr val="lt1"/>
+          </a:fontRef>
+        </p:style>
+        <p:txBody>
+          <a:bodyPr rtlCol="0" anchor="ctr"/>
+          <a:lstStyle/>
+          <a:p>
+            <a:pPr algn="ctr"/>
+            <a:r>
+              <a:rPr lang="en-US" dirty="0"/>
+              <a:t>String Pool</a:t>
+            </a:r>
+          </a:p>
+        </p:txBody>
+      </p:sp>
+      <p:sp>
+        <p:nvSpPr>
+          <p:cNvPr id="7" name="Oval 6">
+            <a:extLst>
+              <a:ext uri="{FF2B5EF4-FFF2-40B4-BE49-F238E27FC236}">
+                <a16:creationId xmlns:a16="http://schemas.microsoft.com/office/drawing/2014/main" id="{1D7679D7-15D0-486A-A207-790311258347}"/>
+              </a:ext>
+            </a:extLst>
+          </p:cNvPr>
+          <p:cNvSpPr/>
+          <p:nvPr/>
+        </p:nvSpPr>
+        <p:spPr>
+          <a:xfrm>
+            <a:off x="10810042" y="4227326"/>
+            <a:ext cx="677662" cy="550415"/>
+          </a:xfrm>
+          <a:prstGeom prst="ellipse">
+            <a:avLst/>
+          </a:prstGeom>
+        </p:spPr>
+        <p:style>
+          <a:lnRef idx="2">
+            <a:schemeClr val="accent3">
+              <a:shade val="50000"/>
+            </a:schemeClr>
+          </a:lnRef>
+          <a:fillRef idx="1">
+            <a:schemeClr val="accent3"/>
+          </a:fillRef>
+          <a:effectRef idx="0">
+            <a:schemeClr val="accent3"/>
+          </a:effectRef>
+          <a:fontRef idx="minor">
+            <a:schemeClr val="lt1"/>
+          </a:fontRef>
+        </p:style>
+        <p:txBody>
+          <a:bodyPr rtlCol="0" anchor="ctr"/>
+          <a:lstStyle/>
+          <a:p>
+            <a:pPr algn="ctr"/>
+            <a:r>
+              <a:rPr lang="en-US" dirty="0"/>
+              <a:t>“s”</a:t>
+            </a:r>
+          </a:p>
+        </p:txBody>
+      </p:sp>
+      <p:sp>
+        <p:nvSpPr>
+          <p:cNvPr id="12" name="Oval 11">
+            <a:extLst>
+              <a:ext uri="{FF2B5EF4-FFF2-40B4-BE49-F238E27FC236}">
+                <a16:creationId xmlns:a16="http://schemas.microsoft.com/office/drawing/2014/main" id="{490B9FEE-6FC9-4B33-A68D-F869C5FB4853}"/>
+              </a:ext>
+            </a:extLst>
+          </p:cNvPr>
+          <p:cNvSpPr/>
+          <p:nvPr/>
+        </p:nvSpPr>
+        <p:spPr>
+          <a:xfrm>
+            <a:off x="9747681" y="4930141"/>
+            <a:ext cx="887768" cy="550415"/>
+          </a:xfrm>
+          <a:prstGeom prst="ellipse">
+            <a:avLst/>
+          </a:prstGeom>
+        </p:spPr>
+        <p:style>
+          <a:lnRef idx="2">
+            <a:schemeClr val="accent3">
+              <a:shade val="50000"/>
+            </a:schemeClr>
+          </a:lnRef>
+          <a:fillRef idx="1">
+            <a:schemeClr val="accent3"/>
+          </a:fillRef>
+          <a:effectRef idx="0">
+            <a:schemeClr val="accent3"/>
+          </a:effectRef>
+          <a:fontRef idx="minor">
+            <a:schemeClr val="lt1"/>
+          </a:fontRef>
+        </p:style>
+        <p:txBody>
+          <a:bodyPr rtlCol="0" anchor="ctr"/>
+          <a:lstStyle/>
+          <a:p>
+            <a:pPr algn="ctr"/>
+            <a:r>
+              <a:rPr lang="en-US" dirty="0"/>
+              <a:t>“ss”</a:t>
+            </a:r>
+          </a:p>
+        </p:txBody>
+      </p:sp>
+      <p:sp>
+        <p:nvSpPr>
+          <p:cNvPr id="14" name="Oval 13">
+            <a:extLst>
+              <a:ext uri="{FF2B5EF4-FFF2-40B4-BE49-F238E27FC236}">
+                <a16:creationId xmlns:a16="http://schemas.microsoft.com/office/drawing/2014/main" id="{E4C63B04-E4B8-4A0F-977B-0C3536AED3FC}"/>
+              </a:ext>
+            </a:extLst>
+          </p:cNvPr>
+          <p:cNvSpPr/>
+          <p:nvPr/>
+        </p:nvSpPr>
+        <p:spPr>
+          <a:xfrm>
+            <a:off x="7939403" y="3821334"/>
+            <a:ext cx="677662" cy="550415"/>
+          </a:xfrm>
+          <a:prstGeom prst="ellipse">
+            <a:avLst/>
+          </a:prstGeom>
+        </p:spPr>
+        <p:style>
+          <a:lnRef idx="2">
+            <a:schemeClr val="accent3">
+              <a:shade val="50000"/>
+            </a:schemeClr>
+          </a:lnRef>
+          <a:fillRef idx="1">
+            <a:schemeClr val="accent3"/>
+          </a:fillRef>
+          <a:effectRef idx="0">
+            <a:schemeClr val="accent3"/>
+          </a:effectRef>
+          <a:fontRef idx="minor">
+            <a:schemeClr val="lt1"/>
+          </a:fontRef>
+        </p:style>
+        <p:txBody>
+          <a:bodyPr rtlCol="0" anchor="ctr"/>
+          <a:lstStyle/>
+          <a:p>
+            <a:pPr algn="ctr"/>
+            <a:r>
+              <a:rPr lang="en-US" dirty="0"/>
+              <a:t>“s”</a:t>
+            </a:r>
+          </a:p>
+        </p:txBody>
+      </p:sp>
+      <p:sp>
+        <p:nvSpPr>
+          <p:cNvPr id="16" name="Oval 15">
+            <a:extLst>
+              <a:ext uri="{FF2B5EF4-FFF2-40B4-BE49-F238E27FC236}">
+                <a16:creationId xmlns:a16="http://schemas.microsoft.com/office/drawing/2014/main" id="{0EE390BD-0B37-431B-8C3D-333997922EF8}"/>
+              </a:ext>
+            </a:extLst>
+          </p:cNvPr>
+          <p:cNvSpPr/>
+          <p:nvPr/>
+        </p:nvSpPr>
+        <p:spPr>
+          <a:xfrm>
+            <a:off x="8185019" y="4474763"/>
+            <a:ext cx="677662" cy="550415"/>
+          </a:xfrm>
+          <a:prstGeom prst="ellipse">
+            <a:avLst/>
+          </a:prstGeom>
+        </p:spPr>
+        <p:style>
+          <a:lnRef idx="2">
+            <a:schemeClr val="accent3">
+              <a:shade val="50000"/>
+            </a:schemeClr>
+          </a:lnRef>
+          <a:fillRef idx="1">
+            <a:schemeClr val="accent3"/>
+          </a:fillRef>
+          <a:effectRef idx="0">
+            <a:schemeClr val="accent3"/>
+          </a:effectRef>
+          <a:fontRef idx="minor">
+            <a:schemeClr val="lt1"/>
+          </a:fontRef>
+        </p:style>
+        <p:txBody>
+          <a:bodyPr rtlCol="0" anchor="ctr"/>
+          <a:lstStyle/>
+          <a:p>
+            <a:pPr algn="ctr"/>
+            <a:r>
+              <a:rPr lang="en-US" dirty="0"/>
+              <a:t>“s”</a:t>
+            </a:r>
+          </a:p>
+        </p:txBody>
+      </p:sp>
+      <p:sp>
+        <p:nvSpPr>
+          <p:cNvPr id="25" name="Oval 24">
+            <a:extLst>
+              <a:ext uri="{FF2B5EF4-FFF2-40B4-BE49-F238E27FC236}">
+                <a16:creationId xmlns:a16="http://schemas.microsoft.com/office/drawing/2014/main" id="{C3F8F147-6BB6-40B9-BE5E-69EA2614CB68}"/>
+              </a:ext>
+            </a:extLst>
+          </p:cNvPr>
+          <p:cNvSpPr/>
+          <p:nvPr/>
+        </p:nvSpPr>
+        <p:spPr>
+          <a:xfrm>
+            <a:off x="7939403" y="5155042"/>
+            <a:ext cx="677662" cy="550415"/>
+          </a:xfrm>
+          <a:prstGeom prst="ellipse">
+            <a:avLst/>
+          </a:prstGeom>
+        </p:spPr>
+        <p:style>
+          <a:lnRef idx="2">
+            <a:schemeClr val="accent3">
+              <a:shade val="50000"/>
+            </a:schemeClr>
+          </a:lnRef>
+          <a:fillRef idx="1">
+            <a:schemeClr val="accent3"/>
+          </a:fillRef>
+          <a:effectRef idx="0">
+            <a:schemeClr val="accent3"/>
+          </a:effectRef>
+          <a:fontRef idx="minor">
+            <a:schemeClr val="lt1"/>
+          </a:fontRef>
+        </p:style>
+        <p:txBody>
+          <a:bodyPr rtlCol="0" anchor="ctr"/>
+          <a:lstStyle/>
+          <a:p>
+            <a:pPr algn="ctr"/>
+            <a:r>
+              <a:rPr lang="en-US" dirty="0"/>
+              <a:t>“s”</a:t>
+            </a:r>
+          </a:p>
+        </p:txBody>
+      </p:sp>
+      <p:sp>
+        <p:nvSpPr>
+          <p:cNvPr id="6" name="Cylinder 5">
+            <a:extLst>
+              <a:ext uri="{FF2B5EF4-FFF2-40B4-BE49-F238E27FC236}">
+                <a16:creationId xmlns:a16="http://schemas.microsoft.com/office/drawing/2014/main" id="{E5D49FE5-2CB6-4975-8AD6-70158AEEDD6C}"/>
+              </a:ext>
+            </a:extLst>
+          </p:cNvPr>
+          <p:cNvSpPr/>
+          <p:nvPr/>
+        </p:nvSpPr>
+        <p:spPr>
+          <a:xfrm>
+            <a:off x="4540736" y="-24329"/>
+            <a:ext cx="2849732" cy="3755254"/>
+          </a:xfrm>
+          <a:prstGeom prst="can">
+            <a:avLst/>
+          </a:prstGeom>
+        </p:spPr>
+        <p:style>
+          <a:lnRef idx="2">
+            <a:schemeClr val="accent1">
+              <a:shade val="50000"/>
+            </a:schemeClr>
+          </a:lnRef>
+          <a:fillRef idx="1">
+            <a:schemeClr val="accent1"/>
+          </a:fillRef>
+          <a:effectRef idx="0">
+            <a:schemeClr val="accent1"/>
+          </a:effectRef>
+          <a:fontRef idx="minor">
+            <a:schemeClr val="lt1"/>
+          </a:fontRef>
+        </p:style>
+        <p:txBody>
+          <a:bodyPr rtlCol="0" anchor="ctr"/>
+          <a:lstStyle/>
+          <a:p>
+            <a:pPr algn="ctr"/>
+            <a:r>
+              <a:rPr lang="en-US" dirty="0"/>
+              <a:t>Stack</a:t>
+            </a:r>
+          </a:p>
+        </p:txBody>
+      </p:sp>
+      <p:sp>
+        <p:nvSpPr>
+          <p:cNvPr id="8" name="Cylinder 7">
+            <a:extLst>
+              <a:ext uri="{FF2B5EF4-FFF2-40B4-BE49-F238E27FC236}">
+                <a16:creationId xmlns:a16="http://schemas.microsoft.com/office/drawing/2014/main" id="{8E2B550C-A11C-4652-9BCB-1A3F5076C445}"/>
+              </a:ext>
+            </a:extLst>
+          </p:cNvPr>
+          <p:cNvSpPr/>
+          <p:nvPr/>
+        </p:nvSpPr>
+        <p:spPr>
+          <a:xfrm>
+            <a:off x="4693136" y="128071"/>
+            <a:ext cx="2849732" cy="3755254"/>
+          </a:xfrm>
+          <a:prstGeom prst="can">
+            <a:avLst/>
+          </a:prstGeom>
+        </p:spPr>
+        <p:style>
+          <a:lnRef idx="2">
+            <a:schemeClr val="accent1">
+              <a:shade val="50000"/>
+            </a:schemeClr>
+          </a:lnRef>
+          <a:fillRef idx="1">
+            <a:schemeClr val="accent1"/>
+          </a:fillRef>
+          <a:effectRef idx="0">
+            <a:schemeClr val="accent1"/>
+          </a:effectRef>
+          <a:fontRef idx="minor">
+            <a:schemeClr val="lt1"/>
+          </a:fontRef>
+        </p:style>
+        <p:txBody>
+          <a:bodyPr rtlCol="0" anchor="ctr"/>
+          <a:lstStyle/>
+          <a:p>
+            <a:pPr algn="ctr"/>
+            <a:r>
+              <a:rPr lang="en-US" dirty="0"/>
+              <a:t>Stack</a:t>
+            </a:r>
+          </a:p>
+        </p:txBody>
+      </p:sp>
+      <p:sp>
+        <p:nvSpPr>
+          <p:cNvPr id="10" name="Cylinder 9">
+            <a:extLst>
+              <a:ext uri="{FF2B5EF4-FFF2-40B4-BE49-F238E27FC236}">
+                <a16:creationId xmlns:a16="http://schemas.microsoft.com/office/drawing/2014/main" id="{EEFDAFCD-01A4-4E82-8BBA-37B003086FF7}"/>
+              </a:ext>
+            </a:extLst>
+          </p:cNvPr>
+          <p:cNvSpPr/>
+          <p:nvPr/>
+        </p:nvSpPr>
+        <p:spPr>
+          <a:xfrm>
+            <a:off x="4845536" y="280471"/>
+            <a:ext cx="2849732" cy="3755254"/>
+          </a:xfrm>
+          <a:prstGeom prst="can">
+            <a:avLst/>
+          </a:prstGeom>
+        </p:spPr>
+        <p:style>
+          <a:lnRef idx="2">
+            <a:schemeClr val="accent1">
+              <a:shade val="50000"/>
+            </a:schemeClr>
+          </a:lnRef>
+          <a:fillRef idx="1">
+            <a:schemeClr val="accent1"/>
+          </a:fillRef>
+          <a:effectRef idx="0">
+            <a:schemeClr val="accent1"/>
+          </a:effectRef>
+          <a:fontRef idx="minor">
+            <a:schemeClr val="lt1"/>
+          </a:fontRef>
+        </p:style>
+        <p:txBody>
+          <a:bodyPr rtlCol="0" anchor="ctr"/>
+          <a:lstStyle/>
+          <a:p>
+            <a:pPr algn="ctr"/>
+            <a:r>
+              <a:rPr lang="en-US" dirty="0"/>
+              <a:t>Stack</a:t>
+            </a:r>
+          </a:p>
+        </p:txBody>
+      </p:sp>
+      <p:sp>
+        <p:nvSpPr>
+          <p:cNvPr id="22" name="Cylinder 21">
+            <a:extLst>
+              <a:ext uri="{FF2B5EF4-FFF2-40B4-BE49-F238E27FC236}">
+                <a16:creationId xmlns:a16="http://schemas.microsoft.com/office/drawing/2014/main" id="{6B928569-483A-426E-9AE1-052A9659E859}"/>
+              </a:ext>
+            </a:extLst>
+          </p:cNvPr>
+          <p:cNvSpPr/>
+          <p:nvPr/>
+        </p:nvSpPr>
+        <p:spPr>
+          <a:xfrm>
+            <a:off x="4997936" y="432871"/>
+            <a:ext cx="2849732" cy="3755254"/>
+          </a:xfrm>
+          <a:prstGeom prst="can">
+            <a:avLst/>
+          </a:prstGeom>
+        </p:spPr>
+        <p:style>
+          <a:lnRef idx="2">
+            <a:schemeClr val="accent1">
+              <a:shade val="50000"/>
+            </a:schemeClr>
+          </a:lnRef>
+          <a:fillRef idx="1">
+            <a:schemeClr val="accent1"/>
+          </a:fillRef>
+          <a:effectRef idx="0">
+            <a:schemeClr val="accent1"/>
+          </a:effectRef>
+          <a:fontRef idx="minor">
+            <a:schemeClr val="lt1"/>
+          </a:fontRef>
+        </p:style>
+        <p:txBody>
+          <a:bodyPr rtlCol="0" anchor="ctr"/>
+          <a:lstStyle/>
+          <a:p>
+            <a:pPr algn="ctr"/>
+            <a:r>
+              <a:rPr lang="en-US" dirty="0"/>
+              <a:t>Stack</a:t>
+            </a:r>
+          </a:p>
+        </p:txBody>
+      </p:sp>
+      <p:sp>
+        <p:nvSpPr>
+          <p:cNvPr id="24" name="Cylinder 23">
+            <a:extLst>
+              <a:ext uri="{FF2B5EF4-FFF2-40B4-BE49-F238E27FC236}">
+                <a16:creationId xmlns:a16="http://schemas.microsoft.com/office/drawing/2014/main" id="{42806E24-D10A-446F-8520-9CDB7AA3A4A8}"/>
+              </a:ext>
+            </a:extLst>
+          </p:cNvPr>
+          <p:cNvSpPr/>
+          <p:nvPr/>
+        </p:nvSpPr>
+        <p:spPr>
+          <a:xfrm>
+            <a:off x="5150336" y="585271"/>
+            <a:ext cx="2849732" cy="3755254"/>
+          </a:xfrm>
+          <a:prstGeom prst="can">
+            <a:avLst/>
+          </a:prstGeom>
+        </p:spPr>
+        <p:style>
+          <a:lnRef idx="2">
+            <a:schemeClr val="accent1">
+              <a:shade val="50000"/>
+            </a:schemeClr>
+          </a:lnRef>
+          <a:fillRef idx="1">
+            <a:schemeClr val="accent1"/>
+          </a:fillRef>
+          <a:effectRef idx="0">
+            <a:schemeClr val="accent1"/>
+          </a:effectRef>
+          <a:fontRef idx="minor">
+            <a:schemeClr val="lt1"/>
+          </a:fontRef>
+        </p:style>
+        <p:txBody>
+          <a:bodyPr rtlCol="0" anchor="ctr"/>
+          <a:lstStyle/>
+          <a:p>
+            <a:pPr algn="ctr"/>
+            <a:r>
+              <a:rPr lang="en-US" dirty="0"/>
+              <a:t>Stack</a:t>
+            </a:r>
+          </a:p>
+        </p:txBody>
+      </p:sp>
+    </p:spTree>
+    <p:extLst>
+      <p:ext uri="{BB962C8B-B14F-4D97-AF65-F5344CB8AC3E}">
+        <p14:creationId xmlns:p14="http://schemas.microsoft.com/office/powerpoint/2010/main" val="1381022210"/>
+      </p:ext>
+    </p:extLst>
+  </p:cSld>
+  <p:clrMapOvr>
+    <a:masterClrMapping/>
+  </p:clrMapOvr>
+</p:sld>
+</file>
+
+<file path=ppt/slides/slide7.xml><?xml version="1.0" encoding="utf-8"?>
+<p:sld xmlns:a="http://schemas.openxmlformats.org/drawingml/2006/main" xmlns:r="http://schemas.openxmlformats.org/officeDocument/2006/relationships" xmlns:p="http://schemas.openxmlformats.org/presentationml/2006/main">
+  <p:cSld>
+    <p:spTree>
+      <p:nvGrpSpPr>
+        <p:cNvPr id="1" name=""/>
+        <p:cNvGrpSpPr/>
+        <p:nvPr/>
+      </p:nvGrpSpPr>
+      <p:grpSpPr>
+        <a:xfrm>
+          <a:off x="0" y="0"/>
+          <a:ext cx="0" cy="0"/>
+          <a:chOff x="0" y="0"/>
+          <a:chExt cx="0" cy="0"/>
+        </a:xfrm>
+      </p:grpSpPr>
+      <p:sp>
+        <p:nvSpPr>
+          <p:cNvPr id="2" name="Title 1">
+            <a:extLst>
+              <a:ext uri="{FF2B5EF4-FFF2-40B4-BE49-F238E27FC236}">
                 <a16:creationId xmlns:a16="http://schemas.microsoft.com/office/drawing/2014/main" id="{66DF7FFD-2090-4299-A25A-F796B3774FC8}"/>
               </a:ext>
             </a:extLst>
@@ -5755,7 +6696,7 @@
 </p:sld>
 </file>
 
-<file path=ppt/slides/slide7.xml><?xml version="1.0" encoding="utf-8"?>
+<file path=ppt/slides/slide8.xml><?xml version="1.0" encoding="utf-8"?>
 <p:sld xmlns:a="http://schemas.openxmlformats.org/drawingml/2006/main" xmlns:r="http://schemas.openxmlformats.org/officeDocument/2006/relationships" xmlns:p="http://schemas.openxmlformats.org/presentationml/2006/main">
   <p:cSld>
     <p:spTree>

</xml_diff>